<commit_message>
Final submission for capstone
</commit_message>
<xml_diff>
--- a/project3/NetflixDisneyPlus.pptx
+++ b/project3/NetflixDisneyPlus.pptx
@@ -6,17 +6,16 @@
   </p:sldMasterIdLst>
   <p:sldIdLst>
     <p:sldId id="256" r:id="rId2"/>
-    <p:sldId id="276" r:id="rId3"/>
-    <p:sldId id="268" r:id="rId4"/>
-    <p:sldId id="272" r:id="rId5"/>
-    <p:sldId id="274" r:id="rId6"/>
-    <p:sldId id="277" r:id="rId7"/>
-    <p:sldId id="278" r:id="rId8"/>
+    <p:sldId id="268" r:id="rId3"/>
+    <p:sldId id="272" r:id="rId4"/>
+    <p:sldId id="274" r:id="rId5"/>
+    <p:sldId id="277" r:id="rId6"/>
+    <p:sldId id="278" r:id="rId7"/>
+    <p:sldId id="282" r:id="rId8"/>
     <p:sldId id="279" r:id="rId9"/>
-    <p:sldId id="281" r:id="rId10"/>
-    <p:sldId id="267" r:id="rId11"/>
-    <p:sldId id="280" r:id="rId12"/>
-    <p:sldId id="269" r:id="rId13"/>
+    <p:sldId id="267" r:id="rId10"/>
+    <p:sldId id="280" r:id="rId11"/>
+    <p:sldId id="269" r:id="rId12"/>
   </p:sldIdLst>
   <p:sldSz cx="12192000" cy="6858000"/>
   <p:notesSz cx="6858000" cy="9144000"/>
@@ -351,7 +350,7 @@
           <a:p>
             <a:fld id="{5D57BD61-9DEE-4E82-9619-396C76F14FE4}" type="datetimeFigureOut">
               <a:rPr lang="en-SG" smtClean="0"/>
-              <a:t>21/3/2021</a:t>
+              <a:t>22/3/2021</a:t>
             </a:fld>
             <a:endParaRPr lang="en-SG"/>
           </a:p>
@@ -559,7 +558,7 @@
           <a:p>
             <a:fld id="{5D57BD61-9DEE-4E82-9619-396C76F14FE4}" type="datetimeFigureOut">
               <a:rPr lang="en-SG" smtClean="0"/>
-              <a:t>21/3/2021</a:t>
+              <a:t>22/3/2021</a:t>
             </a:fld>
             <a:endParaRPr lang="en-SG"/>
           </a:p>
@@ -817,7 +816,7 @@
           <a:p>
             <a:fld id="{5D57BD61-9DEE-4E82-9619-396C76F14FE4}" type="datetimeFigureOut">
               <a:rPr lang="en-SG" smtClean="0"/>
-              <a:t>21/3/2021</a:t>
+              <a:t>22/3/2021</a:t>
             </a:fld>
             <a:endParaRPr lang="en-SG"/>
           </a:p>
@@ -987,7 +986,7 @@
           <a:p>
             <a:fld id="{5D57BD61-9DEE-4E82-9619-396C76F14FE4}" type="datetimeFigureOut">
               <a:rPr lang="en-SG" smtClean="0"/>
-              <a:t>21/3/2021</a:t>
+              <a:t>22/3/2021</a:t>
             </a:fld>
             <a:endParaRPr lang="en-SG"/>
           </a:p>
@@ -1324,7 +1323,7 @@
           <a:p>
             <a:fld id="{5D57BD61-9DEE-4E82-9619-396C76F14FE4}" type="datetimeFigureOut">
               <a:rPr lang="en-SG" smtClean="0"/>
-              <a:t>21/3/2021</a:t>
+              <a:t>22/3/2021</a:t>
             </a:fld>
             <a:endParaRPr lang="en-SG"/>
           </a:p>
@@ -1599,7 +1598,7 @@
           <a:p>
             <a:fld id="{5D57BD61-9DEE-4E82-9619-396C76F14FE4}" type="datetimeFigureOut">
               <a:rPr lang="en-SG" smtClean="0"/>
-              <a:t>21/3/2021</a:t>
+              <a:t>22/3/2021</a:t>
             </a:fld>
             <a:endParaRPr lang="en-SG"/>
           </a:p>
@@ -1978,7 +1977,7 @@
           <a:p>
             <a:fld id="{5D57BD61-9DEE-4E82-9619-396C76F14FE4}" type="datetimeFigureOut">
               <a:rPr lang="en-SG" smtClean="0"/>
-              <a:t>21/3/2021</a:t>
+              <a:t>22/3/2021</a:t>
             </a:fld>
             <a:endParaRPr lang="en-SG"/>
           </a:p>
@@ -2096,7 +2095,7 @@
           <a:p>
             <a:fld id="{5D57BD61-9DEE-4E82-9619-396C76F14FE4}" type="datetimeFigureOut">
               <a:rPr lang="en-SG" smtClean="0"/>
-              <a:t>21/3/2021</a:t>
+              <a:t>22/3/2021</a:t>
             </a:fld>
             <a:endParaRPr lang="en-SG"/>
           </a:p>
@@ -2269,7 +2268,7 @@
           <a:p>
             <a:fld id="{5D57BD61-9DEE-4E82-9619-396C76F14FE4}" type="datetimeFigureOut">
               <a:rPr lang="en-SG" smtClean="0"/>
-              <a:t>21/3/2021</a:t>
+              <a:t>22/3/2021</a:t>
             </a:fld>
             <a:endParaRPr lang="en-SG"/>
           </a:p>
@@ -2625,7 +2624,7 @@
           <a:p>
             <a:fld id="{5D57BD61-9DEE-4E82-9619-396C76F14FE4}" type="datetimeFigureOut">
               <a:rPr lang="en-SG" smtClean="0"/>
-              <a:t>21/3/2021</a:t>
+              <a:t>22/3/2021</a:t>
             </a:fld>
             <a:endParaRPr lang="en-SG"/>
           </a:p>
@@ -3004,7 +3003,7 @@
           <a:p>
             <a:fld id="{5D57BD61-9DEE-4E82-9619-396C76F14FE4}" type="datetimeFigureOut">
               <a:rPr lang="en-SG" smtClean="0"/>
-              <a:t>21/3/2021</a:t>
+              <a:t>22/3/2021</a:t>
             </a:fld>
             <a:endParaRPr lang="en-SG"/>
           </a:p>
@@ -3293,7 +3292,7 @@
           <a:p>
             <a:fld id="{5D57BD61-9DEE-4E82-9619-396C76F14FE4}" type="datetimeFigureOut">
               <a:rPr lang="en-SG" smtClean="0"/>
-              <a:t>21/3/2021</a:t>
+              <a:t>22/3/2021</a:t>
             </a:fld>
             <a:endParaRPr lang="en-SG"/>
           </a:p>
@@ -4028,8 +4027,8 @@
         </p:nvSpPr>
         <p:spPr>
           <a:xfrm>
-            <a:off x="395287" y="1857375"/>
-            <a:ext cx="11401425" cy="4371975"/>
+            <a:off x="6410325" y="1866900"/>
+            <a:ext cx="5005387" cy="3762375"/>
           </a:xfrm>
         </p:spPr>
         <p:txBody>
@@ -4044,16 +4043,7 @@
             </a:pPr>
             <a:r>
               <a:rPr lang="en-US" dirty="0"/>
-              <a:t>  </a:t>
-            </a:r>
-            <a:r>
-              <a:rPr lang="en-US" b="0" i="0" dirty="0">
-                <a:solidFill>
-                  <a:srgbClr val="000000"/>
-                </a:solidFill>
-                <a:effectLst/>
-              </a:rPr>
-              <a:t>So the final model chosen was Naive Bayes with Count Vectorizer which returned an accuracy score of 77% for test data.</a:t>
+              <a:t> On genres basis we can suggest users to go for Disney plus if they are more interested in marvel, animated movies or series.</a:t>
             </a:r>
           </a:p>
           <a:p>
@@ -4062,100 +4052,10 @@
               <a:buChar char="•"/>
             </a:pPr>
             <a:r>
-              <a:rPr lang="en-US" b="0" i="0" dirty="0">
-                <a:solidFill>
-                  <a:srgbClr val="000000"/>
-                </a:solidFill>
-                <a:effectLst/>
-              </a:rPr>
-              <a:t> Common words : watch, series, tv, season, like, recommend, movie, stream, finish, access, subscript and so on. From these words we can interpret that people in general are talking about watching/recommending or have finish watching a series or a movie on a streaming platform. They are also talking or inquiring about the subscription or access policies in different countries.</a:t>
-            </a:r>
-          </a:p>
-          <a:p>
-            <a:pPr algn="just">
-              <a:buFont typeface="Arial" panose="020B0604020202020204" pitchFamily="34" charset="0"/>
-              <a:buChar char="•"/>
-            </a:pPr>
-            <a:r>
               <a:rPr lang="en-US" dirty="0"/>
-              <a:t>Varied genres like crime, marvel, drama, war, love, documentary, anime.</a:t>
-            </a:r>
-          </a:p>
-          <a:p>
-            <a:pPr algn="just">
-              <a:buFont typeface="Arial" panose="020B0604020202020204" pitchFamily="34" charset="0"/>
-              <a:buChar char="•"/>
-            </a:pPr>
-            <a:r>
-              <a:rPr lang="en-US" dirty="0"/>
-              <a:t> Unique words like Wanda vision, stranger things, </a:t>
-            </a:r>
-            <a:r>
-              <a:rPr lang="en-US" dirty="0" err="1"/>
-              <a:t>raya</a:t>
-            </a:r>
-            <a:r>
-              <a:rPr lang="en-US" dirty="0"/>
-              <a:t>, drama, war, marvel, etc. Here we can get a clear understanding of which words belong to which platform.</a:t>
-            </a:r>
-          </a:p>
-          <a:p>
-            <a:pPr lvl="1" algn="just">
-              <a:buFont typeface="Arial" panose="020B0604020202020204" pitchFamily="34" charset="0"/>
-              <a:buChar char="•"/>
-            </a:pPr>
-            <a:r>
-              <a:rPr lang="en-US" sz="2000" dirty="0" err="1"/>
-              <a:t>Wandavision</a:t>
-            </a:r>
-            <a:r>
-              <a:rPr lang="en-US" sz="2000" dirty="0"/>
-              <a:t> is the new series aired in January 2021 on </a:t>
-            </a:r>
-            <a:r>
-              <a:rPr lang="en-US" sz="2000" dirty="0" err="1"/>
-              <a:t>disney</a:t>
-            </a:r>
-            <a:r>
-              <a:rPr lang="en-US" sz="2000" dirty="0"/>
-              <a:t> plus.</a:t>
-            </a:r>
-          </a:p>
-          <a:p>
-            <a:pPr lvl="1" algn="just">
-              <a:buFont typeface="Arial" panose="020B0604020202020204" pitchFamily="34" charset="0"/>
-              <a:buChar char="•"/>
-            </a:pPr>
-            <a:r>
-              <a:rPr lang="en-US" sz="2000" dirty="0"/>
-              <a:t>Stranger things is the American series on Netflix since 2016.</a:t>
-            </a:r>
-          </a:p>
-          <a:p>
-            <a:pPr lvl="1" algn="just">
-              <a:buFont typeface="Arial" panose="020B0604020202020204" pitchFamily="34" charset="0"/>
-              <a:buChar char="•"/>
-            </a:pPr>
-            <a:r>
-              <a:rPr lang="en-US" sz="2000" dirty="0"/>
-              <a:t>Now if we consider drama and marvel features, we can clearly say that </a:t>
-            </a:r>
-            <a:r>
-              <a:rPr lang="en-US" sz="2000" dirty="0" err="1"/>
-              <a:t>disney</a:t>
-            </a:r>
-            <a:r>
-              <a:rPr lang="en-US" sz="2000" dirty="0"/>
-              <a:t> plus airs most of the marvel movies and </a:t>
-            </a:r>
-            <a:r>
-              <a:rPr lang="en-US" sz="2000" dirty="0" err="1"/>
-              <a:t>netflix</a:t>
-            </a:r>
-            <a:r>
-              <a:rPr lang="en-US" sz="2000" dirty="0"/>
-              <a:t> airs most of the drama movies/series.</a:t>
-            </a:r>
+              <a:t> If users are more inclined towards drama, action, anime users should go for Netflix.</a:t>
+            </a:r>
+            <a:endParaRPr lang="en-US" sz="2000" dirty="0"/>
           </a:p>
         </p:txBody>
       </p:sp>
@@ -4212,159 +4112,53 @@
             <a:pPr algn="ctr"/>
             <a:r>
               <a:rPr lang="en-US" sz="4000" dirty="0"/>
-              <a:t>Conclusions</a:t>
+              <a:t>Recommendations</a:t>
             </a:r>
             <a:endParaRPr lang="en-SG" sz="4000" dirty="0"/>
           </a:p>
         </p:txBody>
       </p:sp>
-    </p:spTree>
-    <p:extLst>
-      <p:ext uri="{BB962C8B-B14F-4D97-AF65-F5344CB8AC3E}">
-        <p14:creationId xmlns:p14="http://schemas.microsoft.com/office/powerpoint/2010/main" val="324436377"/>
-      </p:ext>
-    </p:extLst>
-  </p:cSld>
-  <p:clrMapOvr>
-    <a:masterClrMapping/>
-  </p:clrMapOvr>
-</p:sld>
-</file>
-
-<file path=ppt/slides/slide11.xml><?xml version="1.0" encoding="utf-8"?>
-<p:sld xmlns:a="http://schemas.openxmlformats.org/drawingml/2006/main" xmlns:r="http://schemas.openxmlformats.org/officeDocument/2006/relationships" xmlns:p="http://schemas.openxmlformats.org/presentationml/2006/main">
-  <p:cSld>
-    <p:bg>
-      <p:bgPr>
-        <a:solidFill>
-          <a:schemeClr val="bg1"/>
-        </a:solidFill>
-        <a:effectLst/>
-      </p:bgPr>
-    </p:bg>
-    <p:spTree>
-      <p:nvGrpSpPr>
-        <p:cNvPr id="1" name=""/>
-        <p:cNvGrpSpPr/>
-        <p:nvPr/>
-      </p:nvGrpSpPr>
-      <p:grpSpPr>
-        <a:xfrm>
-          <a:off x="0" y="0"/>
-          <a:ext cx="0" cy="0"/>
-          <a:chOff x="0" y="0"/>
-          <a:chExt cx="0" cy="0"/>
-        </a:xfrm>
-      </p:grpSpPr>
-      <p:sp>
-        <p:nvSpPr>
-          <p:cNvPr id="3" name="Content Placeholder 2">
+      <p:pic>
+        <p:nvPicPr>
+          <p:cNvPr id="4" name="Picture 3">
             <a:extLst>
               <a:ext uri="{FF2B5EF4-FFF2-40B4-BE49-F238E27FC236}">
-                <a16:creationId xmlns:a16="http://schemas.microsoft.com/office/drawing/2014/main" id="{4420EFA7-62EF-4B07-A297-EC6E6CDA9CA3}"/>
+                <a16:creationId xmlns:a16="http://schemas.microsoft.com/office/drawing/2014/main" id="{AB5CA845-8FA5-46F6-8852-CD6ACC7179A4}"/>
               </a:ext>
             </a:extLst>
           </p:cNvPr>
-          <p:cNvSpPr>
-            <a:spLocks noGrp="1"/>
-          </p:cNvSpPr>
-          <p:nvPr>
-            <p:ph idx="1"/>
-          </p:nvPr>
-        </p:nvSpPr>
-        <p:spPr>
-          <a:xfrm>
-            <a:off x="395287" y="1857375"/>
-            <a:ext cx="11401425" cy="4371975"/>
-          </a:xfrm>
-        </p:spPr>
-        <p:txBody>
-          <a:bodyPr>
-            <a:noAutofit/>
-          </a:bodyPr>
-          <a:lstStyle/>
-          <a:p>
-            <a:pPr algn="just">
-              <a:buFont typeface="Arial" panose="020B0604020202020204" pitchFamily="34" charset="0"/>
-              <a:buChar char="•"/>
-            </a:pPr>
-            <a:r>
-              <a:rPr lang="en-US" dirty="0"/>
-              <a:t> Disney plus contains movies like Wanda vision which is a superhero fiction movie. It also contains few anime movies like Raya the last dragon, the Simpsons, etc. Hence based on the above and external analysis, on genres basis we can suggest users to go for Disney plus if they are more interested in marvel, animated movies or series.</a:t>
-            </a:r>
-          </a:p>
-          <a:p>
-            <a:pPr algn="just">
-              <a:buFont typeface="Arial" panose="020B0604020202020204" pitchFamily="34" charset="0"/>
-              <a:buChar char="•"/>
-            </a:pPr>
-            <a:r>
-              <a:rPr lang="en-US" dirty="0"/>
-              <a:t> Fewer named of movies and series came up in our analysis but features like drama, stranger things (series on Netflix), documentary, anime, etc. suggest that if users are more inclined towards these genres should go for Netflix.</a:t>
-            </a:r>
-            <a:endParaRPr lang="en-US" sz="2000" dirty="0"/>
-          </a:p>
-        </p:txBody>
-      </p:sp>
-      <p:sp>
-        <p:nvSpPr>
-          <p:cNvPr id="7" name="Title 1">
+          <p:cNvPicPr>
+            <a:picLocks noChangeAspect="1"/>
+          </p:cNvPicPr>
+          <p:nvPr/>
+        </p:nvPicPr>
+        <p:blipFill>
+          <a:blip r:embed="rId2">
             <a:extLst>
-              <a:ext uri="{FF2B5EF4-FFF2-40B4-BE49-F238E27FC236}">
-                <a16:creationId xmlns:a16="http://schemas.microsoft.com/office/drawing/2014/main" id="{E39A2EF1-EEF3-4606-B538-92BB4FD1CDD8}"/>
+              <a:ext uri="{28A0092B-C50C-407E-A947-70E740481C1C}">
+                <a14:useLocalDpi xmlns:a14="http://schemas.microsoft.com/office/drawing/2010/main" val="0"/>
               </a:ext>
             </a:extLst>
-          </p:cNvPr>
-          <p:cNvSpPr txBox="1">
-            <a:spLocks/>
-          </p:cNvSpPr>
-          <p:nvPr/>
-        </p:nvSpPr>
-        <p:spPr>
-          <a:xfrm>
-            <a:off x="1097280" y="96103"/>
-            <a:ext cx="10058400" cy="1450757"/>
+          </a:blip>
+          <a:stretch>
+            <a:fillRect/>
+          </a:stretch>
+        </p:blipFill>
+        <p:spPr>
+          <a:xfrm rot="5400000">
+            <a:off x="1339630" y="1262817"/>
+            <a:ext cx="3999886" cy="5360453"/>
           </a:xfrm>
           <a:prstGeom prst="rect">
             <a:avLst/>
           </a:prstGeom>
-        </p:spPr>
-        <p:txBody>
-          <a:bodyPr vert="horz" lIns="91440" tIns="45720" rIns="91440" bIns="45720" rtlCol="0" anchor="b">
-            <a:normAutofit/>
-          </a:bodyPr>
-          <a:lstStyle>
-            <a:lvl1pPr marL="0" algn="l" defTabSz="914400" rtl="0" eaLnBrk="1" latinLnBrk="0" hangingPunct="1">
-              <a:lnSpc>
-                <a:spcPct val="85000"/>
-              </a:lnSpc>
-              <a:spcBef>
-                <a:spcPct val="0"/>
-              </a:spcBef>
-              <a:buNone/>
-              <a:defRPr sz="4800" kern="1200" spc="-50" baseline="0">
-                <a:solidFill>
-                  <a:schemeClr val="tx1">
-                    <a:lumMod val="75000"/>
-                    <a:lumOff val="25000"/>
-                  </a:schemeClr>
-                </a:solidFill>
-                <a:latin typeface="+mj-lt"/>
-                <a:ea typeface="+mj-ea"/>
-                <a:cs typeface="+mj-cs"/>
-              </a:defRPr>
-            </a:lvl1pPr>
-          </a:lstStyle>
-          <a:p>
-            <a:pPr algn="ctr"/>
-            <a:r>
-              <a:rPr lang="en-US" sz="4000" dirty="0"/>
-              <a:t>Recommendations</a:t>
-            </a:r>
-            <a:endParaRPr lang="en-SG" sz="4000" dirty="0"/>
-          </a:p>
-        </p:txBody>
-      </p:sp>
+          <a:ln>
+            <a:solidFill>
+              <a:schemeClr val="tx1"/>
+            </a:solidFill>
+          </a:ln>
+        </p:spPr>
+      </p:pic>
     </p:spTree>
     <p:extLst>
       <p:ext uri="{BB962C8B-B14F-4D97-AF65-F5344CB8AC3E}">
@@ -4378,7 +4172,7 @@
 </p:sld>
 </file>
 
-<file path=ppt/slides/slide12.xml><?xml version="1.0" encoding="utf-8"?>
+<file path=ppt/slides/slide11.xml><?xml version="1.0" encoding="utf-8"?>
 <p:sld xmlns:a="http://schemas.openxmlformats.org/drawingml/2006/main" xmlns:r="http://schemas.openxmlformats.org/officeDocument/2006/relationships" xmlns:p="http://schemas.openxmlformats.org/presentationml/2006/main">
   <p:cSld>
     <p:bg>
@@ -4518,12 +4312,15 @@
         </p:nvSpPr>
         <p:spPr/>
         <p:txBody>
-          <a:bodyPr/>
+          <a:bodyPr>
+            <a:normAutofit/>
+          </a:bodyPr>
           <a:lstStyle/>
           <a:p>
-            <a:r>
-              <a:rPr lang="en-US" dirty="0"/>
-              <a:t>Content Page</a:t>
+            <a:pPr algn="ctr"/>
+            <a:r>
+              <a:rPr lang="en-US" sz="4000" dirty="0"/>
+              <a:t>Problem Statement</a:t>
             </a:r>
             <a:endParaRPr lang="en-SG" sz="4000" dirty="0"/>
           </a:p>
@@ -4547,8 +4344,8 @@
         </p:nvSpPr>
         <p:spPr>
           <a:xfrm>
-            <a:off x="1097280" y="1817158"/>
-            <a:ext cx="10058400" cy="4393141"/>
+            <a:off x="1097280" y="2129237"/>
+            <a:ext cx="5694045" cy="3400425"/>
           </a:xfrm>
         </p:spPr>
         <p:txBody>
@@ -4557,13 +4354,19 @@
           </a:bodyPr>
           <a:lstStyle/>
           <a:p>
+            <a:pPr marL="0" indent="0">
+              <a:buNone/>
+            </a:pPr>
+            <a:endParaRPr lang="en-US" dirty="0"/>
+          </a:p>
+          <a:p>
             <a:pPr>
               <a:buFont typeface="Wingdings" panose="05000000000000000000" pitchFamily="2" charset="2"/>
               <a:buChar char="§"/>
             </a:pPr>
             <a:r>
-              <a:rPr lang="en-US" sz="2000" dirty="0"/>
-              <a:t> Problem Statement</a:t>
+              <a:rPr lang="en-US" dirty="0"/>
+              <a:t> As more people are shifting towards OTT platform, we would like to get more insights in the      similarities and differences between two of the most competitive online streaming platforms: Netflix and Disney plus. </a:t>
             </a:r>
           </a:p>
           <a:p>
@@ -4572,88 +4375,53 @@
               <a:buChar char="§"/>
             </a:pPr>
             <a:r>
-              <a:rPr lang="en-US" sz="2000" dirty="0"/>
-              <a:t> The Process</a:t>
-            </a:r>
-          </a:p>
-          <a:p>
-            <a:pPr>
-              <a:buFont typeface="Wingdings" panose="05000000000000000000" pitchFamily="2" charset="2"/>
-              <a:buChar char="§"/>
-            </a:pPr>
-            <a:r>
               <a:rPr lang="en-US" dirty="0"/>
-              <a:t> Netflix Words</a:t>
-            </a:r>
-          </a:p>
-          <a:p>
-            <a:pPr>
-              <a:buFont typeface="Wingdings" panose="05000000000000000000" pitchFamily="2" charset="2"/>
-              <a:buChar char="§"/>
-            </a:pPr>
-            <a:r>
-              <a:rPr lang="en-US" dirty="0"/>
-              <a:t> Disney Words</a:t>
-            </a:r>
-          </a:p>
-          <a:p>
-            <a:pPr>
-              <a:buFont typeface="Wingdings" panose="05000000000000000000" pitchFamily="2" charset="2"/>
-              <a:buChar char="§"/>
-            </a:pPr>
-            <a:r>
-              <a:rPr lang="en-US" dirty="0"/>
-              <a:t> Common Words</a:t>
-            </a:r>
-          </a:p>
-          <a:p>
-            <a:pPr>
-              <a:buFont typeface="Wingdings" panose="05000000000000000000" pitchFamily="2" charset="2"/>
-              <a:buChar char="§"/>
-            </a:pPr>
-            <a:r>
-              <a:rPr lang="en-US" dirty="0"/>
-              <a:t> Feature Importance</a:t>
-            </a:r>
-          </a:p>
-          <a:p>
-            <a:pPr>
-              <a:buFont typeface="Wingdings" panose="05000000000000000000" pitchFamily="2" charset="2"/>
-              <a:buChar char="§"/>
-            </a:pPr>
-            <a:r>
-              <a:rPr lang="en-US" dirty="0"/>
-              <a:t> Conclusions &amp; Recommendations</a:t>
-            </a:r>
-          </a:p>
-          <a:p>
-            <a:pPr lvl="1">
-              <a:buFont typeface="Wingdings" panose="05000000000000000000" pitchFamily="2" charset="2"/>
-              <a:buChar char="§"/>
-            </a:pPr>
-            <a:endParaRPr lang="en-US" dirty="0"/>
-          </a:p>
-          <a:p>
-            <a:endParaRPr lang="en-US" sz="2000" dirty="0"/>
-          </a:p>
-          <a:p>
-            <a:endParaRPr lang="en-US" sz="2000" dirty="0"/>
-          </a:p>
-          <a:p>
-            <a:pPr marL="0" indent="0">
-              <a:buNone/>
-            </a:pPr>
-            <a:endParaRPr lang="en-US" sz="2000" dirty="0"/>
-          </a:p>
-          <a:p>
+              <a:t> This analysis would help understand users which platform is more suitable for them and hence which one they would like to choose.</a:t>
+            </a:r>
             <a:endParaRPr lang="en-SG" sz="2000" dirty="0"/>
           </a:p>
         </p:txBody>
       </p:sp>
+      <p:pic>
+        <p:nvPicPr>
+          <p:cNvPr id="5" name="Picture 4">
+            <a:extLst>
+              <a:ext uri="{FF2B5EF4-FFF2-40B4-BE49-F238E27FC236}">
+                <a16:creationId xmlns:a16="http://schemas.microsoft.com/office/drawing/2014/main" id="{EA4AC4B1-C2FB-4804-A1DC-5F1220669989}"/>
+              </a:ext>
+            </a:extLst>
+          </p:cNvPr>
+          <p:cNvPicPr>
+            <a:picLocks noChangeAspect="1"/>
+          </p:cNvPicPr>
+          <p:nvPr/>
+        </p:nvPicPr>
+        <p:blipFill>
+          <a:blip r:embed="rId2">
+            <a:extLst>
+              <a:ext uri="{28A0092B-C50C-407E-A947-70E740481C1C}">
+                <a14:useLocalDpi xmlns:a14="http://schemas.microsoft.com/office/drawing/2010/main" val="0"/>
+              </a:ext>
+            </a:extLst>
+          </a:blip>
+          <a:stretch>
+            <a:fillRect/>
+          </a:stretch>
+        </p:blipFill>
+        <p:spPr>
+          <a:xfrm>
+            <a:off x="7203171" y="2696376"/>
+            <a:ext cx="4028709" cy="2266149"/>
+          </a:xfrm>
+          <a:prstGeom prst="rect">
+            <a:avLst/>
+          </a:prstGeom>
+        </p:spPr>
+      </p:pic>
     </p:spTree>
     <p:extLst>
       <p:ext uri="{BB962C8B-B14F-4D97-AF65-F5344CB8AC3E}">
-        <p14:creationId xmlns:p14="http://schemas.microsoft.com/office/powerpoint/2010/main" val="2089537473"/>
+        <p14:creationId xmlns:p14="http://schemas.microsoft.com/office/powerpoint/2010/main" val="2282695920"/>
       </p:ext>
     </p:extLst>
   </p:cSld>
@@ -4714,7 +4482,7 @@
             <a:pPr algn="ctr"/>
             <a:r>
               <a:rPr lang="en-US" sz="4000" dirty="0"/>
-              <a:t>Problem Statement</a:t>
+              <a:t>The Process</a:t>
             </a:r>
             <a:endParaRPr lang="en-SG" sz="4000" dirty="0"/>
           </a:p>
@@ -4722,100 +4490,509 @@
       </p:sp>
       <p:sp>
         <p:nvSpPr>
-          <p:cNvPr id="3" name="Content Placeholder 2">
+          <p:cNvPr id="4" name="Rectangle 3">
             <a:extLst>
               <a:ext uri="{FF2B5EF4-FFF2-40B4-BE49-F238E27FC236}">
-                <a16:creationId xmlns:a16="http://schemas.microsoft.com/office/drawing/2014/main" id="{EFC565E3-AF3D-452F-B6B9-1D912DD4CD7F}"/>
+                <a16:creationId xmlns:a16="http://schemas.microsoft.com/office/drawing/2014/main" id="{FD42120C-B3B6-4C5C-BA80-330F2A0C442B}"/>
               </a:ext>
             </a:extLst>
           </p:cNvPr>
-          <p:cNvSpPr>
-            <a:spLocks noGrp="1"/>
-          </p:cNvSpPr>
-          <p:nvPr>
-            <p:ph idx="1"/>
-          </p:nvPr>
-        </p:nvSpPr>
-        <p:spPr>
-          <a:xfrm>
-            <a:off x="1097280" y="2129237"/>
-            <a:ext cx="5694045" cy="3400425"/>
-          </a:xfrm>
-        </p:spPr>
-        <p:txBody>
-          <a:bodyPr>
-            <a:normAutofit/>
-          </a:bodyPr>
+          <p:cNvSpPr/>
+          <p:nvPr/>
+        </p:nvSpPr>
+        <p:spPr>
+          <a:xfrm>
+            <a:off x="2156460" y="2354578"/>
+            <a:ext cx="1943100" cy="581025"/>
+          </a:xfrm>
+          <a:prstGeom prst="rect">
+            <a:avLst/>
+          </a:prstGeom>
+        </p:spPr>
+        <p:style>
+          <a:lnRef idx="2">
+            <a:schemeClr val="accent5">
+              <a:shade val="50000"/>
+            </a:schemeClr>
+          </a:lnRef>
+          <a:fillRef idx="1">
+            <a:schemeClr val="accent5"/>
+          </a:fillRef>
+          <a:effectRef idx="0">
+            <a:schemeClr val="accent5"/>
+          </a:effectRef>
+          <a:fontRef idx="minor">
+            <a:schemeClr val="lt1"/>
+          </a:fontRef>
+        </p:style>
+        <p:txBody>
+          <a:bodyPr rtlCol="0" anchor="ctr"/>
           <a:lstStyle/>
           <a:p>
-            <a:pPr marL="0" indent="0">
-              <a:buNone/>
-            </a:pPr>
-            <a:endParaRPr lang="en-US" dirty="0"/>
-          </a:p>
-          <a:p>
-            <a:pPr>
-              <a:buFont typeface="Wingdings" panose="05000000000000000000" pitchFamily="2" charset="2"/>
-              <a:buChar char="§"/>
-            </a:pPr>
+            <a:pPr algn="ctr"/>
             <a:r>
               <a:rPr lang="en-US" dirty="0"/>
-              <a:t> As more people are shifting towards OTT platform, we would like to get more insights in the      similarities and differences between two of the most competitive online streaming platforms: Netflix and Disney plus. </a:t>
-            </a:r>
-          </a:p>
-          <a:p>
-            <a:pPr>
-              <a:buFont typeface="Wingdings" panose="05000000000000000000" pitchFamily="2" charset="2"/>
-              <a:buChar char="§"/>
-            </a:pPr>
-            <a:r>
-              <a:rPr lang="en-US" dirty="0"/>
-              <a:t> This analysis would help understand users which platform is more suitable for them and hence which one they would like to choose.</a:t>
-            </a:r>
-            <a:endParaRPr lang="en-SG" sz="2000" dirty="0"/>
-          </a:p>
-        </p:txBody>
-      </p:sp>
-      <p:pic>
-        <p:nvPicPr>
-          <p:cNvPr id="5" name="Picture 4">
+              <a:t>Web Scraping</a:t>
+            </a:r>
+            <a:endParaRPr lang="en-SG" dirty="0"/>
+          </a:p>
+        </p:txBody>
+      </p:sp>
+      <p:sp>
+        <p:nvSpPr>
+          <p:cNvPr id="5" name="Rectangle 4">
             <a:extLst>
               <a:ext uri="{FF2B5EF4-FFF2-40B4-BE49-F238E27FC236}">
-                <a16:creationId xmlns:a16="http://schemas.microsoft.com/office/drawing/2014/main" id="{EA4AC4B1-C2FB-4804-A1DC-5F1220669989}"/>
+                <a16:creationId xmlns:a16="http://schemas.microsoft.com/office/drawing/2014/main" id="{4CCF8CFD-6066-4977-9294-594AE56DE22A}"/>
               </a:ext>
             </a:extLst>
           </p:cNvPr>
-          <p:cNvPicPr>
-            <a:picLocks noChangeAspect="1"/>
-          </p:cNvPicPr>
+          <p:cNvSpPr/>
           <p:nvPr/>
-        </p:nvPicPr>
-        <p:blipFill>
-          <a:blip r:embed="rId2">
-            <a:extLst>
-              <a:ext uri="{28A0092B-C50C-407E-A947-70E740481C1C}">
-                <a14:useLocalDpi xmlns:a14="http://schemas.microsoft.com/office/drawing/2010/main" val="0"/>
-              </a:ext>
-            </a:extLst>
-          </a:blip>
-          <a:stretch>
-            <a:fillRect/>
-          </a:stretch>
-        </p:blipFill>
-        <p:spPr>
-          <a:xfrm>
-            <a:off x="7203171" y="2696376"/>
-            <a:ext cx="4028709" cy="2266149"/>
+        </p:nvSpPr>
+        <p:spPr>
+          <a:xfrm>
+            <a:off x="5154930" y="2354580"/>
+            <a:ext cx="1943100" cy="581025"/>
           </a:xfrm>
           <a:prstGeom prst="rect">
             <a:avLst/>
           </a:prstGeom>
         </p:spPr>
-      </p:pic>
+        <p:style>
+          <a:lnRef idx="2">
+            <a:schemeClr val="accent5">
+              <a:shade val="50000"/>
+            </a:schemeClr>
+          </a:lnRef>
+          <a:fillRef idx="1">
+            <a:schemeClr val="accent5"/>
+          </a:fillRef>
+          <a:effectRef idx="0">
+            <a:schemeClr val="accent5"/>
+          </a:effectRef>
+          <a:fontRef idx="minor">
+            <a:schemeClr val="lt1"/>
+          </a:fontRef>
+        </p:style>
+        <p:txBody>
+          <a:bodyPr rtlCol="0" anchor="ctr"/>
+          <a:lstStyle/>
+          <a:p>
+            <a:pPr algn="ctr"/>
+            <a:r>
+              <a:rPr lang="en-US" dirty="0"/>
+              <a:t>Data Cleaning</a:t>
+            </a:r>
+            <a:endParaRPr lang="en-SG" dirty="0"/>
+          </a:p>
+        </p:txBody>
+      </p:sp>
+      <p:sp>
+        <p:nvSpPr>
+          <p:cNvPr id="6" name="Rectangle 5">
+            <a:extLst>
+              <a:ext uri="{FF2B5EF4-FFF2-40B4-BE49-F238E27FC236}">
+                <a16:creationId xmlns:a16="http://schemas.microsoft.com/office/drawing/2014/main" id="{5C9852F3-2539-4E1D-9D8F-C7F7E04E5A84}"/>
+              </a:ext>
+            </a:extLst>
+          </p:cNvPr>
+          <p:cNvSpPr/>
+          <p:nvPr/>
+        </p:nvSpPr>
+        <p:spPr>
+          <a:xfrm>
+            <a:off x="8092440" y="2354579"/>
+            <a:ext cx="1943100" cy="581025"/>
+          </a:xfrm>
+          <a:prstGeom prst="rect">
+            <a:avLst/>
+          </a:prstGeom>
+        </p:spPr>
+        <p:style>
+          <a:lnRef idx="2">
+            <a:schemeClr val="accent5">
+              <a:shade val="50000"/>
+            </a:schemeClr>
+          </a:lnRef>
+          <a:fillRef idx="1">
+            <a:schemeClr val="accent5"/>
+          </a:fillRef>
+          <a:effectRef idx="0">
+            <a:schemeClr val="accent5"/>
+          </a:effectRef>
+          <a:fontRef idx="minor">
+            <a:schemeClr val="lt1"/>
+          </a:fontRef>
+        </p:style>
+        <p:txBody>
+          <a:bodyPr rtlCol="0" anchor="ctr"/>
+          <a:lstStyle/>
+          <a:p>
+            <a:pPr algn="ctr"/>
+            <a:r>
+              <a:rPr lang="en-US" dirty="0"/>
+              <a:t>Data Preprocessing</a:t>
+            </a:r>
+            <a:endParaRPr lang="en-SG" dirty="0"/>
+          </a:p>
+        </p:txBody>
+      </p:sp>
+      <p:sp>
+        <p:nvSpPr>
+          <p:cNvPr id="7" name="Rectangle 6">
+            <a:extLst>
+              <a:ext uri="{FF2B5EF4-FFF2-40B4-BE49-F238E27FC236}">
+                <a16:creationId xmlns:a16="http://schemas.microsoft.com/office/drawing/2014/main" id="{4D76E762-F99E-4062-BBE7-53CF7E1E1AF4}"/>
+              </a:ext>
+            </a:extLst>
+          </p:cNvPr>
+          <p:cNvSpPr/>
+          <p:nvPr/>
+        </p:nvSpPr>
+        <p:spPr>
+          <a:xfrm>
+            <a:off x="8092440" y="3843338"/>
+            <a:ext cx="1943100" cy="581025"/>
+          </a:xfrm>
+          <a:prstGeom prst="rect">
+            <a:avLst/>
+          </a:prstGeom>
+        </p:spPr>
+        <p:style>
+          <a:lnRef idx="2">
+            <a:schemeClr val="accent5">
+              <a:shade val="50000"/>
+            </a:schemeClr>
+          </a:lnRef>
+          <a:fillRef idx="1">
+            <a:schemeClr val="accent5"/>
+          </a:fillRef>
+          <a:effectRef idx="0">
+            <a:schemeClr val="accent5"/>
+          </a:effectRef>
+          <a:fontRef idx="minor">
+            <a:schemeClr val="lt1"/>
+          </a:fontRef>
+        </p:style>
+        <p:txBody>
+          <a:bodyPr rtlCol="0" anchor="ctr"/>
+          <a:lstStyle/>
+          <a:p>
+            <a:pPr algn="ctr"/>
+            <a:r>
+              <a:rPr lang="en-US" dirty="0"/>
+              <a:t>Exploratory visualization</a:t>
+            </a:r>
+            <a:endParaRPr lang="en-SG" dirty="0"/>
+          </a:p>
+        </p:txBody>
+      </p:sp>
+      <p:sp>
+        <p:nvSpPr>
+          <p:cNvPr id="8" name="Rectangle 7">
+            <a:extLst>
+              <a:ext uri="{FF2B5EF4-FFF2-40B4-BE49-F238E27FC236}">
+                <a16:creationId xmlns:a16="http://schemas.microsoft.com/office/drawing/2014/main" id="{B64793C1-B07D-45C5-BD4F-124AB40B9CBA}"/>
+              </a:ext>
+            </a:extLst>
+          </p:cNvPr>
+          <p:cNvSpPr/>
+          <p:nvPr/>
+        </p:nvSpPr>
+        <p:spPr>
+          <a:xfrm>
+            <a:off x="5154930" y="3843338"/>
+            <a:ext cx="1943100" cy="581025"/>
+          </a:xfrm>
+          <a:prstGeom prst="rect">
+            <a:avLst/>
+          </a:prstGeom>
+        </p:spPr>
+        <p:style>
+          <a:lnRef idx="2">
+            <a:schemeClr val="accent5">
+              <a:shade val="50000"/>
+            </a:schemeClr>
+          </a:lnRef>
+          <a:fillRef idx="1">
+            <a:schemeClr val="accent5"/>
+          </a:fillRef>
+          <a:effectRef idx="0">
+            <a:schemeClr val="accent5"/>
+          </a:effectRef>
+          <a:fontRef idx="minor">
+            <a:schemeClr val="lt1"/>
+          </a:fontRef>
+        </p:style>
+        <p:txBody>
+          <a:bodyPr rtlCol="0" anchor="ctr"/>
+          <a:lstStyle/>
+          <a:p>
+            <a:pPr algn="ctr"/>
+            <a:r>
+              <a:rPr lang="en-US" dirty="0"/>
+              <a:t>Data Modelling</a:t>
+            </a:r>
+            <a:endParaRPr lang="en-SG" dirty="0"/>
+          </a:p>
+        </p:txBody>
+      </p:sp>
+      <p:sp>
+        <p:nvSpPr>
+          <p:cNvPr id="9" name="Rectangle 8">
+            <a:extLst>
+              <a:ext uri="{FF2B5EF4-FFF2-40B4-BE49-F238E27FC236}">
+                <a16:creationId xmlns:a16="http://schemas.microsoft.com/office/drawing/2014/main" id="{598BE4A7-C943-4000-A18F-67B2606B37FF}"/>
+              </a:ext>
+            </a:extLst>
+          </p:cNvPr>
+          <p:cNvSpPr/>
+          <p:nvPr/>
+        </p:nvSpPr>
+        <p:spPr>
+          <a:xfrm>
+            <a:off x="2156460" y="3843338"/>
+            <a:ext cx="1943100" cy="581025"/>
+          </a:xfrm>
+          <a:prstGeom prst="rect">
+            <a:avLst/>
+          </a:prstGeom>
+        </p:spPr>
+        <p:style>
+          <a:lnRef idx="2">
+            <a:schemeClr val="accent5">
+              <a:shade val="50000"/>
+            </a:schemeClr>
+          </a:lnRef>
+          <a:fillRef idx="1">
+            <a:schemeClr val="accent5"/>
+          </a:fillRef>
+          <a:effectRef idx="0">
+            <a:schemeClr val="accent5"/>
+          </a:effectRef>
+          <a:fontRef idx="minor">
+            <a:schemeClr val="lt1"/>
+          </a:fontRef>
+        </p:style>
+        <p:txBody>
+          <a:bodyPr rtlCol="0" anchor="ctr"/>
+          <a:lstStyle/>
+          <a:p>
+            <a:pPr algn="ctr"/>
+            <a:r>
+              <a:rPr lang="en-US" dirty="0"/>
+              <a:t>Conclusion &amp; Recommendation</a:t>
+            </a:r>
+            <a:endParaRPr lang="en-SG" dirty="0"/>
+          </a:p>
+        </p:txBody>
+      </p:sp>
+      <p:cxnSp>
+        <p:nvCxnSpPr>
+          <p:cNvPr id="12" name="Straight Arrow Connector 11">
+            <a:extLst>
+              <a:ext uri="{FF2B5EF4-FFF2-40B4-BE49-F238E27FC236}">
+                <a16:creationId xmlns:a16="http://schemas.microsoft.com/office/drawing/2014/main" id="{D838F94B-501B-45F1-B25F-6B6CC1DF16C7}"/>
+              </a:ext>
+            </a:extLst>
+          </p:cNvPr>
+          <p:cNvCxnSpPr/>
+          <p:nvPr/>
+        </p:nvCxnSpPr>
+        <p:spPr>
+          <a:xfrm>
+            <a:off x="4257675" y="2645090"/>
+            <a:ext cx="762000" cy="0"/>
+          </a:xfrm>
+          <a:prstGeom prst="straightConnector1">
+            <a:avLst/>
+          </a:prstGeom>
+          <a:ln>
+            <a:tailEnd type="triangle"/>
+          </a:ln>
+        </p:spPr>
+        <p:style>
+          <a:lnRef idx="3">
+            <a:schemeClr val="accent5"/>
+          </a:lnRef>
+          <a:fillRef idx="0">
+            <a:schemeClr val="accent5"/>
+          </a:fillRef>
+          <a:effectRef idx="2">
+            <a:schemeClr val="accent5"/>
+          </a:effectRef>
+          <a:fontRef idx="minor">
+            <a:schemeClr val="tx1"/>
+          </a:fontRef>
+        </p:style>
+      </p:cxnSp>
+      <p:cxnSp>
+        <p:nvCxnSpPr>
+          <p:cNvPr id="13" name="Straight Arrow Connector 12">
+            <a:extLst>
+              <a:ext uri="{FF2B5EF4-FFF2-40B4-BE49-F238E27FC236}">
+                <a16:creationId xmlns:a16="http://schemas.microsoft.com/office/drawing/2014/main" id="{3AD5F65A-9654-424A-9F99-C083D568DCFF}"/>
+              </a:ext>
+            </a:extLst>
+          </p:cNvPr>
+          <p:cNvCxnSpPr/>
+          <p:nvPr/>
+        </p:nvCxnSpPr>
+        <p:spPr>
+          <a:xfrm>
+            <a:off x="7239000" y="2642230"/>
+            <a:ext cx="762000" cy="0"/>
+          </a:xfrm>
+          <a:prstGeom prst="straightConnector1">
+            <a:avLst/>
+          </a:prstGeom>
+          <a:ln>
+            <a:tailEnd type="triangle"/>
+          </a:ln>
+        </p:spPr>
+        <p:style>
+          <a:lnRef idx="3">
+            <a:schemeClr val="accent5"/>
+          </a:lnRef>
+          <a:fillRef idx="0">
+            <a:schemeClr val="accent5"/>
+          </a:fillRef>
+          <a:effectRef idx="2">
+            <a:schemeClr val="accent5"/>
+          </a:effectRef>
+          <a:fontRef idx="minor">
+            <a:schemeClr val="tx1"/>
+          </a:fontRef>
+        </p:style>
+      </p:cxnSp>
+      <p:cxnSp>
+        <p:nvCxnSpPr>
+          <p:cNvPr id="14" name="Straight Arrow Connector 13">
+            <a:extLst>
+              <a:ext uri="{FF2B5EF4-FFF2-40B4-BE49-F238E27FC236}">
+                <a16:creationId xmlns:a16="http://schemas.microsoft.com/office/drawing/2014/main" id="{068BDBA3-C41D-41D6-9B55-C480E75D7D50}"/>
+              </a:ext>
+            </a:extLst>
+          </p:cNvPr>
+          <p:cNvCxnSpPr>
+            <a:cxnSpLocks/>
+          </p:cNvCxnSpPr>
+          <p:nvPr/>
+        </p:nvCxnSpPr>
+        <p:spPr>
+          <a:xfrm>
+            <a:off x="9063990" y="3132295"/>
+            <a:ext cx="0" cy="593410"/>
+          </a:xfrm>
+          <a:prstGeom prst="straightConnector1">
+            <a:avLst/>
+          </a:prstGeom>
+          <a:ln>
+            <a:tailEnd type="triangle"/>
+          </a:ln>
+        </p:spPr>
+        <p:style>
+          <a:lnRef idx="3">
+            <a:schemeClr val="accent5"/>
+          </a:lnRef>
+          <a:fillRef idx="0">
+            <a:schemeClr val="accent5"/>
+          </a:fillRef>
+          <a:effectRef idx="2">
+            <a:schemeClr val="accent5"/>
+          </a:effectRef>
+          <a:fontRef idx="minor">
+            <a:schemeClr val="tx1"/>
+          </a:fontRef>
+        </p:style>
+      </p:cxnSp>
+      <p:cxnSp>
+        <p:nvCxnSpPr>
+          <p:cNvPr id="17" name="Straight Arrow Connector 16">
+            <a:extLst>
+              <a:ext uri="{FF2B5EF4-FFF2-40B4-BE49-F238E27FC236}">
+                <a16:creationId xmlns:a16="http://schemas.microsoft.com/office/drawing/2014/main" id="{9A1414BF-9A75-4DCC-AA60-A7F35C633098}"/>
+              </a:ext>
+            </a:extLst>
+          </p:cNvPr>
+          <p:cNvCxnSpPr>
+            <a:cxnSpLocks/>
+          </p:cNvCxnSpPr>
+          <p:nvPr/>
+        </p:nvCxnSpPr>
+        <p:spPr>
+          <a:xfrm flipH="1">
+            <a:off x="7296150" y="4121465"/>
+            <a:ext cx="664845" cy="0"/>
+          </a:xfrm>
+          <a:prstGeom prst="straightConnector1">
+            <a:avLst/>
+          </a:prstGeom>
+          <a:ln>
+            <a:tailEnd type="triangle"/>
+          </a:ln>
+        </p:spPr>
+        <p:style>
+          <a:lnRef idx="3">
+            <a:schemeClr val="accent5"/>
+          </a:lnRef>
+          <a:fillRef idx="0">
+            <a:schemeClr val="accent5"/>
+          </a:fillRef>
+          <a:effectRef idx="2">
+            <a:schemeClr val="accent5"/>
+          </a:effectRef>
+          <a:fontRef idx="minor">
+            <a:schemeClr val="tx1"/>
+          </a:fontRef>
+        </p:style>
+      </p:cxnSp>
+      <p:cxnSp>
+        <p:nvCxnSpPr>
+          <p:cNvPr id="20" name="Straight Arrow Connector 19">
+            <a:extLst>
+              <a:ext uri="{FF2B5EF4-FFF2-40B4-BE49-F238E27FC236}">
+                <a16:creationId xmlns:a16="http://schemas.microsoft.com/office/drawing/2014/main" id="{1461946A-0B92-4736-8346-864CDA04734A}"/>
+              </a:ext>
+            </a:extLst>
+          </p:cNvPr>
+          <p:cNvCxnSpPr>
+            <a:cxnSpLocks/>
+          </p:cNvCxnSpPr>
+          <p:nvPr/>
+        </p:nvCxnSpPr>
+        <p:spPr>
+          <a:xfrm flipH="1">
+            <a:off x="4257675" y="4083365"/>
+            <a:ext cx="676275" cy="0"/>
+          </a:xfrm>
+          <a:prstGeom prst="straightConnector1">
+            <a:avLst/>
+          </a:prstGeom>
+          <a:ln>
+            <a:tailEnd type="triangle"/>
+          </a:ln>
+        </p:spPr>
+        <p:style>
+          <a:lnRef idx="3">
+            <a:schemeClr val="accent5"/>
+          </a:lnRef>
+          <a:fillRef idx="0">
+            <a:schemeClr val="accent5"/>
+          </a:fillRef>
+          <a:effectRef idx="2">
+            <a:schemeClr val="accent5"/>
+          </a:effectRef>
+          <a:fontRef idx="minor">
+            <a:schemeClr val="tx1"/>
+          </a:fontRef>
+        </p:style>
+      </p:cxnSp>
     </p:spTree>
     <p:extLst>
       <p:ext uri="{BB962C8B-B14F-4D97-AF65-F5344CB8AC3E}">
-        <p14:creationId xmlns:p14="http://schemas.microsoft.com/office/powerpoint/2010/main" val="2282695920"/>
+        <p14:creationId xmlns:p14="http://schemas.microsoft.com/office/powerpoint/2010/main" val="465158454"/>
       </p:ext>
     </p:extLst>
   </p:cSld>
@@ -4852,541 +5029,108 @@
       </p:grpSpPr>
       <p:sp>
         <p:nvSpPr>
-          <p:cNvPr id="2" name="Title 1">
+          <p:cNvPr id="8" name="Title 1">
             <a:extLst>
               <a:ext uri="{FF2B5EF4-FFF2-40B4-BE49-F238E27FC236}">
-                <a16:creationId xmlns:a16="http://schemas.microsoft.com/office/drawing/2014/main" id="{693998E3-0F14-4D09-8B00-398B9902F02D}"/>
+                <a16:creationId xmlns:a16="http://schemas.microsoft.com/office/drawing/2014/main" id="{382C61CF-7D52-42EA-BC6B-80C5DAD1ADB1}"/>
               </a:ext>
             </a:extLst>
           </p:cNvPr>
-          <p:cNvSpPr>
-            <a:spLocks noGrp="1"/>
-          </p:cNvSpPr>
-          <p:nvPr>
-            <p:ph type="title"/>
-          </p:nvPr>
-        </p:nvSpPr>
-        <p:spPr/>
-        <p:txBody>
-          <a:bodyPr>
+          <p:cNvSpPr txBox="1">
+            <a:spLocks/>
+          </p:cNvSpPr>
+          <p:nvPr/>
+        </p:nvSpPr>
+        <p:spPr>
+          <a:xfrm>
+            <a:off x="838200" y="752475"/>
+            <a:ext cx="10448925" cy="714375"/>
+          </a:xfrm>
+          <a:prstGeom prst="rect">
+            <a:avLst/>
+          </a:prstGeom>
+        </p:spPr>
+        <p:txBody>
+          <a:bodyPr vert="horz" lIns="91440" tIns="45720" rIns="91440" bIns="45720" rtlCol="0" anchor="b">
             <a:normAutofit/>
           </a:bodyPr>
-          <a:lstStyle/>
+          <a:lstStyle>
+            <a:lvl1pPr marL="0" algn="l" defTabSz="914400" rtl="0" eaLnBrk="1" latinLnBrk="0" hangingPunct="1">
+              <a:lnSpc>
+                <a:spcPct val="85000"/>
+              </a:lnSpc>
+              <a:spcBef>
+                <a:spcPct val="0"/>
+              </a:spcBef>
+              <a:buNone/>
+              <a:defRPr sz="4800" kern="1200" spc="-50" baseline="0">
+                <a:solidFill>
+                  <a:schemeClr val="tx1">
+                    <a:lumMod val="75000"/>
+                    <a:lumOff val="25000"/>
+                  </a:schemeClr>
+                </a:solidFill>
+                <a:latin typeface="+mj-lt"/>
+                <a:ea typeface="+mj-ea"/>
+                <a:cs typeface="+mj-cs"/>
+              </a:defRPr>
+            </a:lvl1pPr>
+          </a:lstStyle>
           <a:p>
             <a:pPr algn="ctr"/>
             <a:r>
               <a:rPr lang="en-US" sz="4000" dirty="0"/>
-              <a:t>The Process</a:t>
+              <a:t>Netflix Word Cloud</a:t>
             </a:r>
             <a:endParaRPr lang="en-SG" sz="4000" dirty="0"/>
           </a:p>
         </p:txBody>
       </p:sp>
-      <p:sp>
-        <p:nvSpPr>
-          <p:cNvPr id="4" name="Rectangle 3">
+      <p:pic>
+        <p:nvPicPr>
+          <p:cNvPr id="3" name="Picture 2">
             <a:extLst>
               <a:ext uri="{FF2B5EF4-FFF2-40B4-BE49-F238E27FC236}">
-                <a16:creationId xmlns:a16="http://schemas.microsoft.com/office/drawing/2014/main" id="{FD42120C-B3B6-4C5C-BA80-330F2A0C442B}"/>
+                <a16:creationId xmlns:a16="http://schemas.microsoft.com/office/drawing/2014/main" id="{EBA14AFF-4866-41B8-B61D-0A1DE3C19452}"/>
               </a:ext>
             </a:extLst>
           </p:cNvPr>
-          <p:cNvSpPr/>
+          <p:cNvPicPr>
+            <a:picLocks noChangeAspect="1"/>
+          </p:cNvPicPr>
           <p:nvPr/>
-        </p:nvSpPr>
-        <p:spPr>
-          <a:xfrm>
-            <a:off x="2156460" y="2354578"/>
-            <a:ext cx="1943100" cy="581025"/>
+        </p:nvPicPr>
+        <p:blipFill>
+          <a:blip r:embed="rId2">
+            <a:extLst>
+              <a:ext uri="{28A0092B-C50C-407E-A947-70E740481C1C}">
+                <a14:useLocalDpi xmlns:a14="http://schemas.microsoft.com/office/drawing/2010/main" val="0"/>
+              </a:ext>
+            </a:extLst>
+          </a:blip>
+          <a:stretch>
+            <a:fillRect/>
+          </a:stretch>
+        </p:blipFill>
+        <p:spPr>
+          <a:xfrm>
+            <a:off x="1790740" y="2047783"/>
+            <a:ext cx="8543843" cy="3810092"/>
           </a:xfrm>
           <a:prstGeom prst="rect">
             <a:avLst/>
           </a:prstGeom>
-        </p:spPr>
-        <p:style>
-          <a:lnRef idx="2">
-            <a:schemeClr val="accent5">
-              <a:shade val="50000"/>
-            </a:schemeClr>
-          </a:lnRef>
-          <a:fillRef idx="1">
-            <a:schemeClr val="accent5"/>
-          </a:fillRef>
-          <a:effectRef idx="0">
-            <a:schemeClr val="accent5"/>
-          </a:effectRef>
-          <a:fontRef idx="minor">
-            <a:schemeClr val="lt1"/>
-          </a:fontRef>
-        </p:style>
-        <p:txBody>
-          <a:bodyPr rtlCol="0" anchor="ctr"/>
-          <a:lstStyle/>
-          <a:p>
-            <a:pPr algn="ctr"/>
-            <a:r>
-              <a:rPr lang="en-US" dirty="0"/>
-              <a:t>Web Scraping</a:t>
-            </a:r>
-            <a:endParaRPr lang="en-SG" dirty="0"/>
-          </a:p>
-        </p:txBody>
-      </p:sp>
-      <p:sp>
-        <p:nvSpPr>
-          <p:cNvPr id="5" name="Rectangle 4">
-            <a:extLst>
-              <a:ext uri="{FF2B5EF4-FFF2-40B4-BE49-F238E27FC236}">
-                <a16:creationId xmlns:a16="http://schemas.microsoft.com/office/drawing/2014/main" id="{4CCF8CFD-6066-4977-9294-594AE56DE22A}"/>
-              </a:ext>
-            </a:extLst>
-          </p:cNvPr>
-          <p:cNvSpPr/>
-          <p:nvPr/>
-        </p:nvSpPr>
-        <p:spPr>
-          <a:xfrm>
-            <a:off x="5154930" y="2354580"/>
-            <a:ext cx="1943100" cy="581025"/>
-          </a:xfrm>
-          <a:prstGeom prst="rect">
-            <a:avLst/>
-          </a:prstGeom>
-        </p:spPr>
-        <p:style>
-          <a:lnRef idx="2">
-            <a:schemeClr val="accent5">
-              <a:shade val="50000"/>
-            </a:schemeClr>
-          </a:lnRef>
-          <a:fillRef idx="1">
-            <a:schemeClr val="accent5"/>
-          </a:fillRef>
-          <a:effectRef idx="0">
-            <a:schemeClr val="accent5"/>
-          </a:effectRef>
-          <a:fontRef idx="minor">
-            <a:schemeClr val="lt1"/>
-          </a:fontRef>
-        </p:style>
-        <p:txBody>
-          <a:bodyPr rtlCol="0" anchor="ctr"/>
-          <a:lstStyle/>
-          <a:p>
-            <a:pPr algn="ctr"/>
-            <a:r>
-              <a:rPr lang="en-US" dirty="0"/>
-              <a:t>Data Cleaning</a:t>
-            </a:r>
-            <a:endParaRPr lang="en-SG" dirty="0"/>
-          </a:p>
-        </p:txBody>
-      </p:sp>
-      <p:sp>
-        <p:nvSpPr>
-          <p:cNvPr id="6" name="Rectangle 5">
-            <a:extLst>
-              <a:ext uri="{FF2B5EF4-FFF2-40B4-BE49-F238E27FC236}">
-                <a16:creationId xmlns:a16="http://schemas.microsoft.com/office/drawing/2014/main" id="{5C9852F3-2539-4E1D-9D8F-C7F7E04E5A84}"/>
-              </a:ext>
-            </a:extLst>
-          </p:cNvPr>
-          <p:cNvSpPr/>
-          <p:nvPr/>
-        </p:nvSpPr>
-        <p:spPr>
-          <a:xfrm>
-            <a:off x="8092440" y="2354579"/>
-            <a:ext cx="1943100" cy="581025"/>
-          </a:xfrm>
-          <a:prstGeom prst="rect">
-            <a:avLst/>
-          </a:prstGeom>
-        </p:spPr>
-        <p:style>
-          <a:lnRef idx="2">
-            <a:schemeClr val="accent5">
-              <a:shade val="50000"/>
-            </a:schemeClr>
-          </a:lnRef>
-          <a:fillRef idx="1">
-            <a:schemeClr val="accent5"/>
-          </a:fillRef>
-          <a:effectRef idx="0">
-            <a:schemeClr val="accent5"/>
-          </a:effectRef>
-          <a:fontRef idx="minor">
-            <a:schemeClr val="lt1"/>
-          </a:fontRef>
-        </p:style>
-        <p:txBody>
-          <a:bodyPr rtlCol="0" anchor="ctr"/>
-          <a:lstStyle/>
-          <a:p>
-            <a:pPr algn="ctr"/>
-            <a:r>
-              <a:rPr lang="en-US" dirty="0"/>
-              <a:t>Data Preprocessing</a:t>
-            </a:r>
-            <a:endParaRPr lang="en-SG" dirty="0"/>
-          </a:p>
-        </p:txBody>
-      </p:sp>
-      <p:sp>
-        <p:nvSpPr>
-          <p:cNvPr id="7" name="Rectangle 6">
-            <a:extLst>
-              <a:ext uri="{FF2B5EF4-FFF2-40B4-BE49-F238E27FC236}">
-                <a16:creationId xmlns:a16="http://schemas.microsoft.com/office/drawing/2014/main" id="{4D76E762-F99E-4062-BBE7-53CF7E1E1AF4}"/>
-              </a:ext>
-            </a:extLst>
-          </p:cNvPr>
-          <p:cNvSpPr/>
-          <p:nvPr/>
-        </p:nvSpPr>
-        <p:spPr>
-          <a:xfrm>
-            <a:off x="8092440" y="3843338"/>
-            <a:ext cx="1943100" cy="581025"/>
-          </a:xfrm>
-          <a:prstGeom prst="rect">
-            <a:avLst/>
-          </a:prstGeom>
-        </p:spPr>
-        <p:style>
-          <a:lnRef idx="2">
-            <a:schemeClr val="accent5">
-              <a:shade val="50000"/>
-            </a:schemeClr>
-          </a:lnRef>
-          <a:fillRef idx="1">
-            <a:schemeClr val="accent5"/>
-          </a:fillRef>
-          <a:effectRef idx="0">
-            <a:schemeClr val="accent5"/>
-          </a:effectRef>
-          <a:fontRef idx="minor">
-            <a:schemeClr val="lt1"/>
-          </a:fontRef>
-        </p:style>
-        <p:txBody>
-          <a:bodyPr rtlCol="0" anchor="ctr"/>
-          <a:lstStyle/>
-          <a:p>
-            <a:pPr algn="ctr"/>
-            <a:r>
-              <a:rPr lang="en-US" dirty="0"/>
-              <a:t>Exploratory visualization</a:t>
-            </a:r>
-            <a:endParaRPr lang="en-SG" dirty="0"/>
-          </a:p>
-        </p:txBody>
-      </p:sp>
-      <p:sp>
-        <p:nvSpPr>
-          <p:cNvPr id="8" name="Rectangle 7">
-            <a:extLst>
-              <a:ext uri="{FF2B5EF4-FFF2-40B4-BE49-F238E27FC236}">
-                <a16:creationId xmlns:a16="http://schemas.microsoft.com/office/drawing/2014/main" id="{B64793C1-B07D-45C5-BD4F-124AB40B9CBA}"/>
-              </a:ext>
-            </a:extLst>
-          </p:cNvPr>
-          <p:cNvSpPr/>
-          <p:nvPr/>
-        </p:nvSpPr>
-        <p:spPr>
-          <a:xfrm>
-            <a:off x="5154930" y="3843338"/>
-            <a:ext cx="1943100" cy="581025"/>
-          </a:xfrm>
-          <a:prstGeom prst="rect">
-            <a:avLst/>
-          </a:prstGeom>
-        </p:spPr>
-        <p:style>
-          <a:lnRef idx="2">
-            <a:schemeClr val="accent5">
-              <a:shade val="50000"/>
-            </a:schemeClr>
-          </a:lnRef>
-          <a:fillRef idx="1">
-            <a:schemeClr val="accent5"/>
-          </a:fillRef>
-          <a:effectRef idx="0">
-            <a:schemeClr val="accent5"/>
-          </a:effectRef>
-          <a:fontRef idx="minor">
-            <a:schemeClr val="lt1"/>
-          </a:fontRef>
-        </p:style>
-        <p:txBody>
-          <a:bodyPr rtlCol="0" anchor="ctr"/>
-          <a:lstStyle/>
-          <a:p>
-            <a:pPr algn="ctr"/>
-            <a:r>
-              <a:rPr lang="en-US" dirty="0"/>
-              <a:t>Data Modelling</a:t>
-            </a:r>
-            <a:endParaRPr lang="en-SG" dirty="0"/>
-          </a:p>
-        </p:txBody>
-      </p:sp>
-      <p:sp>
-        <p:nvSpPr>
-          <p:cNvPr id="9" name="Rectangle 8">
-            <a:extLst>
-              <a:ext uri="{FF2B5EF4-FFF2-40B4-BE49-F238E27FC236}">
-                <a16:creationId xmlns:a16="http://schemas.microsoft.com/office/drawing/2014/main" id="{598BE4A7-C943-4000-A18F-67B2606B37FF}"/>
-              </a:ext>
-            </a:extLst>
-          </p:cNvPr>
-          <p:cNvSpPr/>
-          <p:nvPr/>
-        </p:nvSpPr>
-        <p:spPr>
-          <a:xfrm>
-            <a:off x="2156460" y="3843338"/>
-            <a:ext cx="1943100" cy="581025"/>
-          </a:xfrm>
-          <a:prstGeom prst="rect">
-            <a:avLst/>
-          </a:prstGeom>
-        </p:spPr>
-        <p:style>
-          <a:lnRef idx="2">
-            <a:schemeClr val="accent5">
-              <a:shade val="50000"/>
-            </a:schemeClr>
-          </a:lnRef>
-          <a:fillRef idx="1">
-            <a:schemeClr val="accent5"/>
-          </a:fillRef>
-          <a:effectRef idx="0">
-            <a:schemeClr val="accent5"/>
-          </a:effectRef>
-          <a:fontRef idx="minor">
-            <a:schemeClr val="lt1"/>
-          </a:fontRef>
-        </p:style>
-        <p:txBody>
-          <a:bodyPr rtlCol="0" anchor="ctr"/>
-          <a:lstStyle/>
-          <a:p>
-            <a:pPr algn="ctr"/>
-            <a:r>
-              <a:rPr lang="en-US" dirty="0"/>
-              <a:t>Conclusion &amp; Recommendation</a:t>
-            </a:r>
-            <a:endParaRPr lang="en-SG" dirty="0"/>
-          </a:p>
-        </p:txBody>
-      </p:sp>
-      <p:cxnSp>
-        <p:nvCxnSpPr>
-          <p:cNvPr id="12" name="Straight Arrow Connector 11">
-            <a:extLst>
-              <a:ext uri="{FF2B5EF4-FFF2-40B4-BE49-F238E27FC236}">
-                <a16:creationId xmlns:a16="http://schemas.microsoft.com/office/drawing/2014/main" id="{D838F94B-501B-45F1-B25F-6B6CC1DF16C7}"/>
-              </a:ext>
-            </a:extLst>
-          </p:cNvPr>
-          <p:cNvCxnSpPr/>
-          <p:nvPr/>
-        </p:nvCxnSpPr>
-        <p:spPr>
-          <a:xfrm>
-            <a:off x="4257675" y="2645090"/>
-            <a:ext cx="762000" cy="0"/>
-          </a:xfrm>
-          <a:prstGeom prst="straightConnector1">
-            <a:avLst/>
-          </a:prstGeom>
-          <a:ln>
-            <a:tailEnd type="triangle"/>
+          <a:ln w="3175">
+            <a:solidFill>
+              <a:schemeClr val="tx1"/>
+            </a:solidFill>
           </a:ln>
         </p:spPr>
-        <p:style>
-          <a:lnRef idx="3">
-            <a:schemeClr val="accent5"/>
-          </a:lnRef>
-          <a:fillRef idx="0">
-            <a:schemeClr val="accent5"/>
-          </a:fillRef>
-          <a:effectRef idx="2">
-            <a:schemeClr val="accent5"/>
-          </a:effectRef>
-          <a:fontRef idx="minor">
-            <a:schemeClr val="tx1"/>
-          </a:fontRef>
-        </p:style>
-      </p:cxnSp>
-      <p:cxnSp>
-        <p:nvCxnSpPr>
-          <p:cNvPr id="13" name="Straight Arrow Connector 12">
-            <a:extLst>
-              <a:ext uri="{FF2B5EF4-FFF2-40B4-BE49-F238E27FC236}">
-                <a16:creationId xmlns:a16="http://schemas.microsoft.com/office/drawing/2014/main" id="{3AD5F65A-9654-424A-9F99-C083D568DCFF}"/>
-              </a:ext>
-            </a:extLst>
-          </p:cNvPr>
-          <p:cNvCxnSpPr/>
-          <p:nvPr/>
-        </p:nvCxnSpPr>
-        <p:spPr>
-          <a:xfrm>
-            <a:off x="7239000" y="2642230"/>
-            <a:ext cx="762000" cy="0"/>
-          </a:xfrm>
-          <a:prstGeom prst="straightConnector1">
-            <a:avLst/>
-          </a:prstGeom>
-          <a:ln>
-            <a:tailEnd type="triangle"/>
-          </a:ln>
-        </p:spPr>
-        <p:style>
-          <a:lnRef idx="3">
-            <a:schemeClr val="accent5"/>
-          </a:lnRef>
-          <a:fillRef idx="0">
-            <a:schemeClr val="accent5"/>
-          </a:fillRef>
-          <a:effectRef idx="2">
-            <a:schemeClr val="accent5"/>
-          </a:effectRef>
-          <a:fontRef idx="minor">
-            <a:schemeClr val="tx1"/>
-          </a:fontRef>
-        </p:style>
-      </p:cxnSp>
-      <p:cxnSp>
-        <p:nvCxnSpPr>
-          <p:cNvPr id="14" name="Straight Arrow Connector 13">
-            <a:extLst>
-              <a:ext uri="{FF2B5EF4-FFF2-40B4-BE49-F238E27FC236}">
-                <a16:creationId xmlns:a16="http://schemas.microsoft.com/office/drawing/2014/main" id="{068BDBA3-C41D-41D6-9B55-C480E75D7D50}"/>
-              </a:ext>
-            </a:extLst>
-          </p:cNvPr>
-          <p:cNvCxnSpPr>
-            <a:cxnSpLocks/>
-          </p:cNvCxnSpPr>
-          <p:nvPr/>
-        </p:nvCxnSpPr>
-        <p:spPr>
-          <a:xfrm>
-            <a:off x="9063990" y="3132295"/>
-            <a:ext cx="0" cy="593410"/>
-          </a:xfrm>
-          <a:prstGeom prst="straightConnector1">
-            <a:avLst/>
-          </a:prstGeom>
-          <a:ln>
-            <a:tailEnd type="triangle"/>
-          </a:ln>
-        </p:spPr>
-        <p:style>
-          <a:lnRef idx="3">
-            <a:schemeClr val="accent5"/>
-          </a:lnRef>
-          <a:fillRef idx="0">
-            <a:schemeClr val="accent5"/>
-          </a:fillRef>
-          <a:effectRef idx="2">
-            <a:schemeClr val="accent5"/>
-          </a:effectRef>
-          <a:fontRef idx="minor">
-            <a:schemeClr val="tx1"/>
-          </a:fontRef>
-        </p:style>
-      </p:cxnSp>
-      <p:cxnSp>
-        <p:nvCxnSpPr>
-          <p:cNvPr id="17" name="Straight Arrow Connector 16">
-            <a:extLst>
-              <a:ext uri="{FF2B5EF4-FFF2-40B4-BE49-F238E27FC236}">
-                <a16:creationId xmlns:a16="http://schemas.microsoft.com/office/drawing/2014/main" id="{9A1414BF-9A75-4DCC-AA60-A7F35C633098}"/>
-              </a:ext>
-            </a:extLst>
-          </p:cNvPr>
-          <p:cNvCxnSpPr>
-            <a:cxnSpLocks/>
-          </p:cNvCxnSpPr>
-          <p:nvPr/>
-        </p:nvCxnSpPr>
-        <p:spPr>
-          <a:xfrm flipH="1">
-            <a:off x="7296150" y="4121465"/>
-            <a:ext cx="664845" cy="0"/>
-          </a:xfrm>
-          <a:prstGeom prst="straightConnector1">
-            <a:avLst/>
-          </a:prstGeom>
-          <a:ln>
-            <a:tailEnd type="triangle"/>
-          </a:ln>
-        </p:spPr>
-        <p:style>
-          <a:lnRef idx="3">
-            <a:schemeClr val="accent5"/>
-          </a:lnRef>
-          <a:fillRef idx="0">
-            <a:schemeClr val="accent5"/>
-          </a:fillRef>
-          <a:effectRef idx="2">
-            <a:schemeClr val="accent5"/>
-          </a:effectRef>
-          <a:fontRef idx="minor">
-            <a:schemeClr val="tx1"/>
-          </a:fontRef>
-        </p:style>
-      </p:cxnSp>
-      <p:cxnSp>
-        <p:nvCxnSpPr>
-          <p:cNvPr id="20" name="Straight Arrow Connector 19">
-            <a:extLst>
-              <a:ext uri="{FF2B5EF4-FFF2-40B4-BE49-F238E27FC236}">
-                <a16:creationId xmlns:a16="http://schemas.microsoft.com/office/drawing/2014/main" id="{1461946A-0B92-4736-8346-864CDA04734A}"/>
-              </a:ext>
-            </a:extLst>
-          </p:cNvPr>
-          <p:cNvCxnSpPr>
-            <a:cxnSpLocks/>
-          </p:cNvCxnSpPr>
-          <p:nvPr/>
-        </p:nvCxnSpPr>
-        <p:spPr>
-          <a:xfrm flipH="1">
-            <a:off x="4257675" y="4083365"/>
-            <a:ext cx="676275" cy="0"/>
-          </a:xfrm>
-          <a:prstGeom prst="straightConnector1">
-            <a:avLst/>
-          </a:prstGeom>
-          <a:ln>
-            <a:tailEnd type="triangle"/>
-          </a:ln>
-        </p:spPr>
-        <p:style>
-          <a:lnRef idx="3">
-            <a:schemeClr val="accent5"/>
-          </a:lnRef>
-          <a:fillRef idx="0">
-            <a:schemeClr val="accent5"/>
-          </a:fillRef>
-          <a:effectRef idx="2">
-            <a:schemeClr val="accent5"/>
-          </a:effectRef>
-          <a:fontRef idx="minor">
-            <a:schemeClr val="tx1"/>
-          </a:fontRef>
-        </p:style>
-      </p:cxnSp>
+      </p:pic>
     </p:spTree>
     <p:extLst>
       <p:ext uri="{BB962C8B-B14F-4D97-AF65-F5344CB8AC3E}">
-        <p14:creationId xmlns:p14="http://schemas.microsoft.com/office/powerpoint/2010/main" val="465158454"/>
+        <p14:creationId xmlns:p14="http://schemas.microsoft.com/office/powerpoint/2010/main" val="2085493922"/>
       </p:ext>
     </p:extLst>
   </p:cSld>
@@ -5474,7 +5218,7 @@
             <a:pPr algn="ctr"/>
             <a:r>
               <a:rPr lang="en-US" sz="4000" dirty="0"/>
-              <a:t>Netflix Word Cloud</a:t>
+              <a:t>Disney Plus Word Cloud</a:t>
             </a:r>
             <a:endParaRPr lang="en-SG" sz="4000" dirty="0"/>
           </a:p>
@@ -5502,14 +5246,13 @@
               </a:ext>
             </a:extLst>
           </a:blip>
-          <a:stretch>
-            <a:fillRect/>
-          </a:stretch>
+          <a:srcRect/>
+          <a:stretch/>
         </p:blipFill>
         <p:spPr>
           <a:xfrm>
-            <a:off x="1790740" y="2047783"/>
-            <a:ext cx="8543843" cy="3810092"/>
+            <a:off x="1790740" y="2061315"/>
+            <a:ext cx="8543843" cy="3783027"/>
           </a:xfrm>
           <a:prstGeom prst="rect">
             <a:avLst/>
@@ -5524,7 +5267,7 @@
     </p:spTree>
     <p:extLst>
       <p:ext uri="{BB962C8B-B14F-4D97-AF65-F5344CB8AC3E}">
-        <p14:creationId xmlns:p14="http://schemas.microsoft.com/office/powerpoint/2010/main" val="2085493922"/>
+        <p14:creationId xmlns:p14="http://schemas.microsoft.com/office/powerpoint/2010/main" val="800661973"/>
       </p:ext>
     </p:extLst>
   </p:cSld>
@@ -5612,7 +5355,7 @@
             <a:pPr algn="ctr"/>
             <a:r>
               <a:rPr lang="en-US" sz="4000" dirty="0"/>
-              <a:t>Disney Plus Word Cloud</a:t>
+              <a:t>Common Words</a:t>
             </a:r>
             <a:endParaRPr lang="en-SG" sz="4000" dirty="0"/>
           </a:p>
@@ -5620,10 +5363,10 @@
       </p:sp>
       <p:pic>
         <p:nvPicPr>
-          <p:cNvPr id="3" name="Picture 2">
+          <p:cNvPr id="4" name="Picture 3">
             <a:extLst>
               <a:ext uri="{FF2B5EF4-FFF2-40B4-BE49-F238E27FC236}">
-                <a16:creationId xmlns:a16="http://schemas.microsoft.com/office/drawing/2014/main" id="{EBA14AFF-4866-41B8-B61D-0A1DE3C19452}"/>
+                <a16:creationId xmlns:a16="http://schemas.microsoft.com/office/drawing/2014/main" id="{492E47C7-8D6F-4EE2-BA3D-3B2045B10EE6}"/>
               </a:ext>
             </a:extLst>
           </p:cNvPr>
@@ -5640,13 +5383,14 @@
               </a:ext>
             </a:extLst>
           </a:blip>
-          <a:srcRect/>
-          <a:stretch/>
+          <a:stretch>
+            <a:fillRect/>
+          </a:stretch>
         </p:blipFill>
         <p:spPr>
           <a:xfrm>
-            <a:off x="1790740" y="2061315"/>
-            <a:ext cx="8543843" cy="3783027"/>
+            <a:off x="838200" y="1895387"/>
+            <a:ext cx="6521582" cy="4328911"/>
           </a:xfrm>
           <a:prstGeom prst="rect">
             <a:avLst/>
@@ -5658,10 +5402,55 @@
           </a:ln>
         </p:spPr>
       </p:pic>
+      <p:sp>
+        <p:nvSpPr>
+          <p:cNvPr id="5" name="TextBox 4">
+            <a:extLst>
+              <a:ext uri="{FF2B5EF4-FFF2-40B4-BE49-F238E27FC236}">
+                <a16:creationId xmlns:a16="http://schemas.microsoft.com/office/drawing/2014/main" id="{FAFF8B58-A122-47FE-B1C4-947EDC8BAC98}"/>
+              </a:ext>
+            </a:extLst>
+          </p:cNvPr>
+          <p:cNvSpPr txBox="1"/>
+          <p:nvPr/>
+        </p:nvSpPr>
+        <p:spPr>
+          <a:xfrm>
+            <a:off x="7591425" y="1895387"/>
+            <a:ext cx="3533775" cy="1754326"/>
+          </a:xfrm>
+          <a:prstGeom prst="rect">
+            <a:avLst/>
+          </a:prstGeom>
+          <a:noFill/>
+        </p:spPr>
+        <p:txBody>
+          <a:bodyPr wrap="square" rtlCol="0">
+            <a:spAutoFit/>
+          </a:bodyPr>
+          <a:lstStyle/>
+          <a:p>
+            <a:r>
+              <a:rPr lang="en-US" dirty="0"/>
+              <a:t>Some general obvious words like watch, show, movie, episode, season, etc.</a:t>
+            </a:r>
+          </a:p>
+          <a:p>
+            <a:endParaRPr lang="en-US" dirty="0"/>
+          </a:p>
+          <a:p>
+            <a:r>
+              <a:rPr lang="en-US" dirty="0"/>
+              <a:t>Not many unique words specific to any one platform came up.</a:t>
+            </a:r>
+            <a:endParaRPr lang="en-SG" dirty="0"/>
+          </a:p>
+        </p:txBody>
+      </p:sp>
     </p:spTree>
     <p:extLst>
       <p:ext uri="{BB962C8B-B14F-4D97-AF65-F5344CB8AC3E}">
-        <p14:creationId xmlns:p14="http://schemas.microsoft.com/office/powerpoint/2010/main" val="800661973"/>
+        <p14:creationId xmlns:p14="http://schemas.microsoft.com/office/powerpoint/2010/main" val="2881425554"/>
       </p:ext>
     </p:extLst>
   </p:cSld>
@@ -5749,18 +5538,112 @@
             <a:pPr algn="ctr"/>
             <a:r>
               <a:rPr lang="en-US" sz="4000" dirty="0"/>
-              <a:t>Common Words</a:t>
+              <a:t>Model Comparison</a:t>
             </a:r>
             <a:endParaRPr lang="en-SG" sz="4000" dirty="0"/>
+          </a:p>
+        </p:txBody>
+      </p:sp>
+      <p:sp>
+        <p:nvSpPr>
+          <p:cNvPr id="5" name="TextBox 4">
+            <a:extLst>
+              <a:ext uri="{FF2B5EF4-FFF2-40B4-BE49-F238E27FC236}">
+                <a16:creationId xmlns:a16="http://schemas.microsoft.com/office/drawing/2014/main" id="{FAFF8B58-A122-47FE-B1C4-947EDC8BAC98}"/>
+              </a:ext>
+            </a:extLst>
+          </p:cNvPr>
+          <p:cNvSpPr txBox="1"/>
+          <p:nvPr/>
+        </p:nvSpPr>
+        <p:spPr>
+          <a:xfrm>
+            <a:off x="1290637" y="4535494"/>
+            <a:ext cx="9544050" cy="1754326"/>
+          </a:xfrm>
+          <a:prstGeom prst="rect">
+            <a:avLst/>
+          </a:prstGeom>
+          <a:noFill/>
+        </p:spPr>
+        <p:txBody>
+          <a:bodyPr wrap="square" rtlCol="0">
+            <a:spAutoFit/>
+          </a:bodyPr>
+          <a:lstStyle/>
+          <a:p>
+            <a:pPr marL="285750" indent="-285750">
+              <a:buFont typeface="Arial" panose="020B0604020202020204" pitchFamily="34" charset="0"/>
+              <a:buChar char="•"/>
+            </a:pPr>
+            <a:r>
+              <a:rPr lang="en-US" dirty="0"/>
+              <a:t>Build and compared several models:</a:t>
+            </a:r>
+          </a:p>
+          <a:p>
+            <a:pPr marL="342900" indent="-342900">
+              <a:buAutoNum type="arabicParenR"/>
+            </a:pPr>
+            <a:r>
+              <a:rPr lang="en-US" dirty="0"/>
+              <a:t>Logistic Regression</a:t>
+            </a:r>
+          </a:p>
+          <a:p>
+            <a:pPr marL="342900" indent="-342900">
+              <a:buAutoNum type="arabicParenR"/>
+            </a:pPr>
+            <a:r>
+              <a:rPr lang="en-US" dirty="0"/>
+              <a:t>Naive Bayes</a:t>
+            </a:r>
+          </a:p>
+          <a:p>
+            <a:pPr marL="342900" indent="-342900">
+              <a:buAutoNum type="arabicParenR"/>
+            </a:pPr>
+            <a:r>
+              <a:rPr lang="en-US" dirty="0"/>
+              <a:t>Random Forest Tree</a:t>
+            </a:r>
+          </a:p>
+          <a:p>
+            <a:pPr marL="285750" indent="-285750">
+              <a:buFont typeface="Arial" panose="020B0604020202020204" pitchFamily="34" charset="0"/>
+              <a:buChar char="•"/>
+            </a:pPr>
+            <a:r>
+              <a:rPr lang="en-US" dirty="0"/>
+              <a:t>Again build and compared Random Forest and Naive Bayes by adding additional </a:t>
+            </a:r>
+            <a:r>
+              <a:rPr lang="en-US" dirty="0" err="1"/>
+              <a:t>stopwords</a:t>
+            </a:r>
+            <a:r>
+              <a:rPr lang="en-US" dirty="0"/>
+              <a:t>.</a:t>
+            </a:r>
+          </a:p>
+          <a:p>
+            <a:pPr marL="285750" indent="-285750">
+              <a:buFont typeface="Arial" panose="020B0604020202020204" pitchFamily="34" charset="0"/>
+              <a:buChar char="•"/>
+            </a:pPr>
+            <a:r>
+              <a:rPr lang="en-US" dirty="0"/>
+              <a:t>Choose Naive Bayes as final model which gave 77% accuracy for predictions.</a:t>
+            </a:r>
           </a:p>
         </p:txBody>
       </p:sp>
       <p:pic>
         <p:nvPicPr>
-          <p:cNvPr id="4" name="Picture 3">
+          <p:cNvPr id="3" name="Picture 2">
             <a:extLst>
               <a:ext uri="{FF2B5EF4-FFF2-40B4-BE49-F238E27FC236}">
-                <a16:creationId xmlns:a16="http://schemas.microsoft.com/office/drawing/2014/main" id="{492E47C7-8D6F-4EE2-BA3D-3B2045B10EE6}"/>
+                <a16:creationId xmlns:a16="http://schemas.microsoft.com/office/drawing/2014/main" id="{43CAA017-F168-4837-B9FE-577F3E9E05A5}"/>
               </a:ext>
             </a:extLst>
           </p:cNvPr>
@@ -5783,8 +5666,8 @@
         </p:blipFill>
         <p:spPr>
           <a:xfrm>
-            <a:off x="838200" y="1895387"/>
-            <a:ext cx="6521582" cy="4328911"/>
+            <a:off x="838200" y="3143241"/>
+            <a:ext cx="6381853" cy="973162"/>
           </a:xfrm>
           <a:prstGeom prst="rect">
             <a:avLst/>
@@ -5796,55 +5679,92 @@
           </a:ln>
         </p:spPr>
       </p:pic>
-      <p:sp>
-        <p:nvSpPr>
-          <p:cNvPr id="5" name="TextBox 4">
+      <p:pic>
+        <p:nvPicPr>
+          <p:cNvPr id="7" name="Picture 6">
             <a:extLst>
               <a:ext uri="{FF2B5EF4-FFF2-40B4-BE49-F238E27FC236}">
-                <a16:creationId xmlns:a16="http://schemas.microsoft.com/office/drawing/2014/main" id="{FAFF8B58-A122-47FE-B1C4-947EDC8BAC98}"/>
+                <a16:creationId xmlns:a16="http://schemas.microsoft.com/office/drawing/2014/main" id="{F0CCA55E-EE55-4DE2-B5F1-DABE0A3550EE}"/>
               </a:ext>
             </a:extLst>
           </p:cNvPr>
-          <p:cNvSpPr txBox="1"/>
+          <p:cNvPicPr>
+            <a:picLocks noChangeAspect="1"/>
+          </p:cNvPicPr>
           <p:nvPr/>
-        </p:nvSpPr>
-        <p:spPr>
-          <a:xfrm>
-            <a:off x="7591425" y="1895387"/>
-            <a:ext cx="3533775" cy="1754326"/>
+        </p:nvPicPr>
+        <p:blipFill>
+          <a:blip r:embed="rId3">
+            <a:extLst>
+              <a:ext uri="{28A0092B-C50C-407E-A947-70E740481C1C}">
+                <a14:useLocalDpi xmlns:a14="http://schemas.microsoft.com/office/drawing/2010/main" val="0"/>
+              </a:ext>
+            </a:extLst>
+          </a:blip>
+          <a:stretch>
+            <a:fillRect/>
+          </a:stretch>
+        </p:blipFill>
+        <p:spPr>
+          <a:xfrm>
+            <a:off x="838200" y="1987519"/>
+            <a:ext cx="7105650" cy="973162"/>
           </a:xfrm>
           <a:prstGeom prst="rect">
             <a:avLst/>
           </a:prstGeom>
-          <a:noFill/>
-        </p:spPr>
-        <p:txBody>
-          <a:bodyPr wrap="square" rtlCol="0">
-            <a:spAutoFit/>
-          </a:bodyPr>
-          <a:lstStyle/>
-          <a:p>
-            <a:r>
-              <a:rPr lang="en-US" dirty="0"/>
-              <a:t>Some general obvious words like watch, show, movie, episode, season, etc.</a:t>
-            </a:r>
-          </a:p>
-          <a:p>
-            <a:endParaRPr lang="en-US" dirty="0"/>
-          </a:p>
-          <a:p>
-            <a:r>
-              <a:rPr lang="en-US" dirty="0"/>
-              <a:t>Not many unique words specific to any one platform came up.</a:t>
-            </a:r>
-            <a:endParaRPr lang="en-SG" dirty="0"/>
-          </a:p>
-        </p:txBody>
-      </p:sp>
+          <a:ln w="3175">
+            <a:solidFill>
+              <a:schemeClr val="tx1"/>
+            </a:solidFill>
+          </a:ln>
+        </p:spPr>
+      </p:pic>
+      <p:pic>
+        <p:nvPicPr>
+          <p:cNvPr id="10" name="Picture 9">
+            <a:extLst>
+              <a:ext uri="{FF2B5EF4-FFF2-40B4-BE49-F238E27FC236}">
+                <a16:creationId xmlns:a16="http://schemas.microsoft.com/office/drawing/2014/main" id="{517EEDF9-2A3B-4DB0-B656-2DD5BD1ED597}"/>
+              </a:ext>
+            </a:extLst>
+          </p:cNvPr>
+          <p:cNvPicPr>
+            <a:picLocks noChangeAspect="1"/>
+          </p:cNvPicPr>
+          <p:nvPr/>
+        </p:nvPicPr>
+        <p:blipFill>
+          <a:blip r:embed="rId4">
+            <a:extLst>
+              <a:ext uri="{28A0092B-C50C-407E-A947-70E740481C1C}">
+                <a14:useLocalDpi xmlns:a14="http://schemas.microsoft.com/office/drawing/2010/main" val="0"/>
+              </a:ext>
+            </a:extLst>
+          </a:blip>
+          <a:stretch>
+            <a:fillRect/>
+          </a:stretch>
+        </p:blipFill>
+        <p:spPr>
+          <a:xfrm>
+            <a:off x="8277154" y="1987519"/>
+            <a:ext cx="2905195" cy="2492102"/>
+          </a:xfrm>
+          <a:prstGeom prst="rect">
+            <a:avLst/>
+          </a:prstGeom>
+          <a:ln w="3175">
+            <a:solidFill>
+              <a:schemeClr val="tx1"/>
+            </a:solidFill>
+          </a:ln>
+        </p:spPr>
+      </p:pic>
     </p:spTree>
     <p:extLst>
       <p:ext uri="{BB962C8B-B14F-4D97-AF65-F5344CB8AC3E}">
-        <p14:creationId xmlns:p14="http://schemas.microsoft.com/office/powerpoint/2010/main" val="2881425554"/>
+        <p14:creationId xmlns:p14="http://schemas.microsoft.com/office/powerpoint/2010/main" val="2678124892"/>
       </p:ext>
     </p:extLst>
   </p:cSld>
@@ -5932,7 +5852,7 @@
             <a:pPr algn="ctr"/>
             <a:r>
               <a:rPr lang="en-US" sz="4000" dirty="0"/>
-              <a:t>Feature Importance</a:t>
+              <a:t>Important Features</a:t>
             </a:r>
             <a:endParaRPr lang="en-SG" sz="4000" dirty="0"/>
           </a:p>
@@ -6060,10 +5980,196 @@
       </p:grpSpPr>
       <p:sp>
         <p:nvSpPr>
-          <p:cNvPr id="8" name="Title 1">
+          <p:cNvPr id="3" name="Content Placeholder 2">
             <a:extLst>
               <a:ext uri="{FF2B5EF4-FFF2-40B4-BE49-F238E27FC236}">
-                <a16:creationId xmlns:a16="http://schemas.microsoft.com/office/drawing/2014/main" id="{382C61CF-7D52-42EA-BC6B-80C5DAD1ADB1}"/>
+                <a16:creationId xmlns:a16="http://schemas.microsoft.com/office/drawing/2014/main" id="{4420EFA7-62EF-4B07-A297-EC6E6CDA9CA3}"/>
+              </a:ext>
+            </a:extLst>
+          </p:cNvPr>
+          <p:cNvSpPr>
+            <a:spLocks noGrp="1"/>
+          </p:cNvSpPr>
+          <p:nvPr>
+            <p:ph idx="1"/>
+          </p:nvPr>
+        </p:nvSpPr>
+        <p:spPr>
+          <a:xfrm>
+            <a:off x="395287" y="1857375"/>
+            <a:ext cx="11401425" cy="4371975"/>
+          </a:xfrm>
+        </p:spPr>
+        <p:txBody>
+          <a:bodyPr>
+            <a:noAutofit/>
+          </a:bodyPr>
+          <a:lstStyle/>
+          <a:p>
+            <a:pPr algn="just">
+              <a:buFont typeface="Arial" panose="020B0604020202020204" pitchFamily="34" charset="0"/>
+              <a:buChar char="•"/>
+            </a:pPr>
+            <a:r>
+              <a:rPr lang="en-US" b="0" i="0" dirty="0">
+                <a:solidFill>
+                  <a:srgbClr val="000000"/>
+                </a:solidFill>
+                <a:effectLst/>
+              </a:rPr>
+              <a:t>Common words : watch, series, tv, season, like, recommend, movie, stream, finish, access, subscript. </a:t>
+            </a:r>
+          </a:p>
+          <a:p>
+            <a:pPr algn="just">
+              <a:buFont typeface="Arial" panose="020B0604020202020204" pitchFamily="34" charset="0"/>
+              <a:buChar char="•"/>
+            </a:pPr>
+            <a:r>
+              <a:rPr lang="en-US" b="0" i="0" dirty="0">
+                <a:solidFill>
+                  <a:srgbClr val="000000"/>
+                </a:solidFill>
+                <a:effectLst/>
+              </a:rPr>
+              <a:t>Posts are about </a:t>
+            </a:r>
+            <a:r>
+              <a:rPr lang="en-US" b="0" i="0" dirty="0" err="1">
+                <a:solidFill>
+                  <a:srgbClr val="000000"/>
+                </a:solidFill>
+                <a:effectLst/>
+              </a:rPr>
+              <a:t>about</a:t>
+            </a:r>
+            <a:r>
+              <a:rPr lang="en-US" b="0" i="0" dirty="0">
+                <a:solidFill>
+                  <a:srgbClr val="000000"/>
+                </a:solidFill>
+                <a:effectLst/>
+              </a:rPr>
+              <a:t> watching/recommending or have finished watching a series or a movie on a streaming platform. </a:t>
+            </a:r>
+          </a:p>
+          <a:p>
+            <a:pPr algn="just">
+              <a:buFont typeface="Arial" panose="020B0604020202020204" pitchFamily="34" charset="0"/>
+              <a:buChar char="•"/>
+            </a:pPr>
+            <a:r>
+              <a:rPr lang="en-US" dirty="0">
+                <a:solidFill>
+                  <a:srgbClr val="000000"/>
+                </a:solidFill>
+              </a:rPr>
+              <a:t>I</a:t>
+            </a:r>
+            <a:r>
+              <a:rPr lang="en-US" b="0" i="0" dirty="0">
+                <a:solidFill>
+                  <a:srgbClr val="000000"/>
+                </a:solidFill>
+                <a:effectLst/>
+              </a:rPr>
+              <a:t>nquiring about the subscription or access policies in different countries.</a:t>
+            </a:r>
+          </a:p>
+          <a:p>
+            <a:pPr algn="just">
+              <a:buFont typeface="Arial" panose="020B0604020202020204" pitchFamily="34" charset="0"/>
+              <a:buChar char="•"/>
+            </a:pPr>
+            <a:r>
+              <a:rPr lang="en-US" dirty="0"/>
+              <a:t>Varied genres like crime, marvel, drama, war, love, documentary, anime.</a:t>
+            </a:r>
+          </a:p>
+          <a:p>
+            <a:pPr algn="just">
+              <a:buFont typeface="Arial" panose="020B0604020202020204" pitchFamily="34" charset="0"/>
+              <a:buChar char="•"/>
+            </a:pPr>
+            <a:r>
+              <a:rPr lang="en-US" dirty="0"/>
+              <a:t> Unique words : Wanda vision, stranger things, </a:t>
+            </a:r>
+            <a:r>
+              <a:rPr lang="en-US" dirty="0" err="1"/>
+              <a:t>raya</a:t>
+            </a:r>
+            <a:r>
+              <a:rPr lang="en-US" dirty="0"/>
+              <a:t>, drama, war, marvel, etc. </a:t>
+            </a:r>
+          </a:p>
+          <a:p>
+            <a:pPr lvl="1" algn="just">
+              <a:buFont typeface="Arial" panose="020B0604020202020204" pitchFamily="34" charset="0"/>
+              <a:buChar char="•"/>
+            </a:pPr>
+            <a:r>
+              <a:rPr lang="en-US" sz="2000" dirty="0" err="1"/>
+              <a:t>Wandavision</a:t>
+            </a:r>
+            <a:r>
+              <a:rPr lang="en-US" sz="2000" dirty="0"/>
+              <a:t> is the new series aired in January 2021 on </a:t>
+            </a:r>
+            <a:r>
+              <a:rPr lang="en-US" sz="2000" dirty="0" err="1"/>
+              <a:t>disney</a:t>
+            </a:r>
+            <a:r>
+              <a:rPr lang="en-US" sz="2000" dirty="0"/>
+              <a:t> plus.</a:t>
+            </a:r>
+          </a:p>
+          <a:p>
+            <a:pPr lvl="1" algn="just">
+              <a:buFont typeface="Arial" panose="020B0604020202020204" pitchFamily="34" charset="0"/>
+              <a:buChar char="•"/>
+            </a:pPr>
+            <a:r>
+              <a:rPr lang="en-US" sz="2000" dirty="0"/>
+              <a:t>Cecil hotel is the American series on Netflix since 2016.</a:t>
+            </a:r>
+          </a:p>
+          <a:p>
+            <a:pPr lvl="1" algn="just">
+              <a:buFont typeface="Arial" panose="020B0604020202020204" pitchFamily="34" charset="0"/>
+              <a:buChar char="•"/>
+            </a:pPr>
+            <a:r>
+              <a:rPr lang="en-US" sz="2000" dirty="0"/>
+              <a:t>Now if we consider drama and marvel features, we can clearly say that </a:t>
+            </a:r>
+            <a:r>
+              <a:rPr lang="en-US" sz="2000" dirty="0" err="1"/>
+              <a:t>disney</a:t>
+            </a:r>
+            <a:r>
+              <a:rPr lang="en-US" sz="2000" dirty="0"/>
+              <a:t> plus airs most of the marvel movies and </a:t>
+            </a:r>
+            <a:r>
+              <a:rPr lang="en-US" sz="2000" dirty="0" err="1"/>
+              <a:t>netflix</a:t>
+            </a:r>
+            <a:r>
+              <a:rPr lang="en-US" sz="2000" dirty="0"/>
+              <a:t> airs most of the drama movies/series.</a:t>
+            </a:r>
+          </a:p>
+        </p:txBody>
+      </p:sp>
+      <p:sp>
+        <p:nvSpPr>
+          <p:cNvPr id="7" name="Title 1">
+            <a:extLst>
+              <a:ext uri="{FF2B5EF4-FFF2-40B4-BE49-F238E27FC236}">
+                <a16:creationId xmlns:a16="http://schemas.microsoft.com/office/drawing/2014/main" id="{E39A2EF1-EEF3-4606-B538-92BB4FD1CDD8}"/>
               </a:ext>
             </a:extLst>
           </p:cNvPr>
@@ -6074,8 +6180,8 @@
         </p:nvSpPr>
         <p:spPr>
           <a:xfrm>
-            <a:off x="838200" y="752475"/>
-            <a:ext cx="10448925" cy="714375"/>
+            <a:off x="1097280" y="96103"/>
+            <a:ext cx="10058400" cy="1450757"/>
           </a:xfrm>
           <a:prstGeom prst="rect">
             <a:avLst/>
@@ -6111,93 +6217,16 @@
             <a:pPr algn="ctr"/>
             <a:r>
               <a:rPr lang="en-US" sz="4000" dirty="0"/>
-              <a:t>External Analysis</a:t>
+              <a:t>Conclusions</a:t>
             </a:r>
             <a:endParaRPr lang="en-SG" sz="4000" dirty="0"/>
-          </a:p>
-        </p:txBody>
-      </p:sp>
-      <p:pic>
-        <p:nvPicPr>
-          <p:cNvPr id="4" name="Picture 3">
-            <a:extLst>
-              <a:ext uri="{FF2B5EF4-FFF2-40B4-BE49-F238E27FC236}">
-                <a16:creationId xmlns:a16="http://schemas.microsoft.com/office/drawing/2014/main" id="{19460F0E-BADA-40A8-BE42-B4067307AC00}"/>
-              </a:ext>
-            </a:extLst>
-          </p:cNvPr>
-          <p:cNvPicPr>
-            <a:picLocks noChangeAspect="1"/>
-          </p:cNvPicPr>
-          <p:nvPr/>
-        </p:nvPicPr>
-        <p:blipFill>
-          <a:blip r:embed="rId2">
-            <a:extLst>
-              <a:ext uri="{28A0092B-C50C-407E-A947-70E740481C1C}">
-                <a14:useLocalDpi xmlns:a14="http://schemas.microsoft.com/office/drawing/2010/main" val="0"/>
-              </a:ext>
-            </a:extLst>
-          </a:blip>
-          <a:stretch>
-            <a:fillRect/>
-          </a:stretch>
-        </p:blipFill>
-        <p:spPr>
-          <a:xfrm rot="5400000">
-            <a:off x="3644489" y="1037968"/>
-            <a:ext cx="4390793" cy="5884327"/>
-          </a:xfrm>
-          <a:prstGeom prst="rect">
-            <a:avLst/>
-          </a:prstGeom>
-          <a:ln>
-            <a:solidFill>
-              <a:schemeClr val="tx1"/>
-            </a:solidFill>
-          </a:ln>
-        </p:spPr>
-      </p:pic>
-      <p:sp>
-        <p:nvSpPr>
-          <p:cNvPr id="5" name="TextBox 4">
-            <a:extLst>
-              <a:ext uri="{FF2B5EF4-FFF2-40B4-BE49-F238E27FC236}">
-                <a16:creationId xmlns:a16="http://schemas.microsoft.com/office/drawing/2014/main" id="{184C046E-8C74-4375-9474-9189BDA23FDE}"/>
-              </a:ext>
-            </a:extLst>
-          </p:cNvPr>
-          <p:cNvSpPr txBox="1"/>
-          <p:nvPr/>
-        </p:nvSpPr>
-        <p:spPr>
-          <a:xfrm>
-            <a:off x="38099" y="6447931"/>
-            <a:ext cx="10963275" cy="369332"/>
-          </a:xfrm>
-          <a:prstGeom prst="rect">
-            <a:avLst/>
-          </a:prstGeom>
-          <a:noFill/>
-        </p:spPr>
-        <p:txBody>
-          <a:bodyPr wrap="square" rtlCol="0">
-            <a:spAutoFit/>
-          </a:bodyPr>
-          <a:lstStyle/>
-          <a:p>
-            <a:r>
-              <a:rPr lang="en-US" dirty="0"/>
-              <a:t>Source: https://www.theringer.com/tv/2020/6/8/21283950/streaming-service-comparison-hbo-max-netflix-disney</a:t>
-            </a:r>
-            <a:endParaRPr lang="en-SG" dirty="0"/>
           </a:p>
         </p:txBody>
       </p:sp>
     </p:spTree>
     <p:extLst>
       <p:ext uri="{BB962C8B-B14F-4D97-AF65-F5344CB8AC3E}">
-        <p14:creationId xmlns:p14="http://schemas.microsoft.com/office/powerpoint/2010/main" val="2514128730"/>
+        <p14:creationId xmlns:p14="http://schemas.microsoft.com/office/powerpoint/2010/main" val="324436377"/>
       </p:ext>
     </p:extLst>
   </p:cSld>

</xml_diff>